<commit_message>
Tag 3: Übungsaufgaben und Abschlussübungsaufgabe
</commit_message>
<xml_diff>
--- a/slides/Tag-3_5-Abschluss.pptx
+++ b/slides/Tag-3_5-Abschluss.pptx
@@ -6,16 +6,22 @@
     <p:sldMasterId id="2147483649" r:id="rId2"/>
   </p:sldMasterIdLst>
   <p:notesMasterIdLst>
-    <p:notesMasterId r:id="rId7"/>
+    <p:notesMasterId r:id="rId13"/>
   </p:notesMasterIdLst>
   <p:handoutMasterIdLst>
-    <p:handoutMasterId r:id="rId8"/>
+    <p:handoutMasterId r:id="rId14"/>
   </p:handoutMasterIdLst>
   <p:sldIdLst>
     <p:sldId id="288" r:id="rId3"/>
     <p:sldId id="289" r:id="rId4"/>
-    <p:sldId id="726" r:id="rId5"/>
+    <p:sldId id="291" r:id="rId5"/>
     <p:sldId id="597" r:id="rId6"/>
+    <p:sldId id="635" r:id="rId7"/>
+    <p:sldId id="627" r:id="rId8"/>
+    <p:sldId id="628" r:id="rId9"/>
+    <p:sldId id="629" r:id="rId10"/>
+    <p:sldId id="630" r:id="rId11"/>
+    <p:sldId id="631" r:id="rId12"/>
   </p:sldIdLst>
   <p:sldSz cx="9144000" cy="6858000" type="screen4x3"/>
   <p:notesSz cx="6784975" cy="9921875"/>
@@ -923,6 +929,91 @@
 </p:notesMaster>
 </file>
 
+<file path=ppt/notesSlides/notesSlide1.xml><?xml version="1.0" encoding="utf-8"?>
+<p:notes xmlns:a="http://schemas.openxmlformats.org/drawingml/2006/main" xmlns:r="http://schemas.openxmlformats.org/officeDocument/2006/relationships" xmlns:p="http://schemas.openxmlformats.org/presentationml/2006/main">
+  <p:cSld>
+    <p:spTree>
+      <p:nvGrpSpPr>
+        <p:cNvPr id="1" name=""/>
+        <p:cNvGrpSpPr/>
+        <p:nvPr/>
+      </p:nvGrpSpPr>
+      <p:grpSpPr>
+        <a:xfrm>
+          <a:off x="0" y="0"/>
+          <a:ext cx="0" cy="0"/>
+          <a:chOff x="0" y="0"/>
+          <a:chExt cx="0" cy="0"/>
+        </a:xfrm>
+      </p:grpSpPr>
+      <p:sp>
+        <p:nvSpPr>
+          <p:cNvPr id="2" name="Folienbildplatzhalter 1"/>
+          <p:cNvSpPr>
+            <a:spLocks noGrp="1" noRot="1" noChangeAspect="1"/>
+          </p:cNvSpPr>
+          <p:nvPr>
+            <p:ph type="sldImg"/>
+          </p:nvPr>
+        </p:nvSpPr>
+        <p:spPr/>
+      </p:sp>
+      <p:sp>
+        <p:nvSpPr>
+          <p:cNvPr id="3" name="Notizenplatzhalter 2"/>
+          <p:cNvSpPr>
+            <a:spLocks noGrp="1"/>
+          </p:cNvSpPr>
+          <p:nvPr>
+            <p:ph type="body" idx="1"/>
+          </p:nvPr>
+        </p:nvSpPr>
+        <p:spPr/>
+        <p:txBody>
+          <a:bodyPr/>
+          <a:lstStyle/>
+          <a:p>
+            <a:endParaRPr lang="de-DE" dirty="0"/>
+          </a:p>
+        </p:txBody>
+      </p:sp>
+      <p:sp>
+        <p:nvSpPr>
+          <p:cNvPr id="4" name="Foliennummernplatzhalter 3"/>
+          <p:cNvSpPr>
+            <a:spLocks noGrp="1"/>
+          </p:cNvSpPr>
+          <p:nvPr>
+            <p:ph type="sldNum" sz="quarter" idx="5"/>
+          </p:nvPr>
+        </p:nvSpPr>
+        <p:spPr/>
+        <p:txBody>
+          <a:bodyPr/>
+          <a:lstStyle/>
+          <a:p>
+            <a:fld id="{18182567-388C-4D33-8B7B-A651F195F118}" type="slidenum">
+              <a:rPr lang="de-DE" altLang="de-DE" smtClean="0"/>
+              <a:pPr/>
+              <a:t>4</a:t>
+            </a:fld>
+            <a:endParaRPr lang="de-DE" altLang="de-DE"/>
+          </a:p>
+        </p:txBody>
+      </p:sp>
+    </p:spTree>
+    <p:extLst>
+      <p:ext uri="{BB962C8B-B14F-4D97-AF65-F5344CB8AC3E}">
+        <p14:creationId xmlns:p14="http://schemas.microsoft.com/office/powerpoint/2010/main" val="1051163142"/>
+      </p:ext>
+    </p:extLst>
+  </p:cSld>
+  <p:clrMapOvr>
+    <a:masterClrMapping/>
+  </p:clrMapOvr>
+</p:notes>
+</file>
+
 <file path=ppt/slideLayouts/slideLayout1.xml><?xml version="1.0" encoding="utf-8"?>
 <p:sldLayout xmlns:a="http://schemas.openxmlformats.org/drawingml/2006/main" xmlns:r="http://schemas.openxmlformats.org/officeDocument/2006/relationships" xmlns:p="http://schemas.openxmlformats.org/presentationml/2006/main" type="obj" preserve="1">
   <p:cSld name="Titel und Inhalt">
@@ -1649,7 +1740,7 @@
           <a:p>
             <a:pPr lvl="4"/>
             <a:r>
-              <a:rPr lang="de-DE" altLang="de-DE" dirty="0"/>
+              <a:rPr lang="de-DE" altLang="de-DE"/>
               <a:t>Fünfte Ebene</a:t>
             </a:r>
           </a:p>
@@ -1783,7 +1874,7 @@
         <p:spPr bwMode="auto">
           <a:xfrm>
             <a:off x="4252913" y="6424613"/>
-            <a:ext cx="1495922" cy="246221"/>
+            <a:ext cx="2121093" cy="246221"/>
           </a:xfrm>
           <a:prstGeom prst="rect">
             <a:avLst/>
@@ -1813,7 +1904,7 @@
                 </a:solidFill>
                 <a:latin typeface="Arial" charset="0"/>
               </a:rPr>
-              <a:t>Tag-3_5-Abschluss.ppt</a:t>
+              <a:t>Tag-3_2_2-Container-Registry.ppt</a:t>
             </a:r>
             <a:endParaRPr lang="de-DE" dirty="0">
               <a:solidFill>
@@ -3649,6 +3740,578 @@
 </p:sld>
 </file>
 
+<file path=ppt/slides/slide10.xml><?xml version="1.0" encoding="utf-8"?>
+<p:sld xmlns:a="http://schemas.openxmlformats.org/drawingml/2006/main" xmlns:r="http://schemas.openxmlformats.org/officeDocument/2006/relationships" xmlns:p="http://schemas.openxmlformats.org/presentationml/2006/main">
+  <p:cSld>
+    <p:spTree>
+      <p:nvGrpSpPr>
+        <p:cNvPr id="1" name=""/>
+        <p:cNvGrpSpPr/>
+        <p:nvPr/>
+      </p:nvGrpSpPr>
+      <p:grpSpPr>
+        <a:xfrm>
+          <a:off x="0" y="0"/>
+          <a:ext cx="0" cy="0"/>
+          <a:chOff x="0" y="0"/>
+          <a:chExt cx="0" cy="0"/>
+        </a:xfrm>
+      </p:grpSpPr>
+      <p:sp>
+        <p:nvSpPr>
+          <p:cNvPr id="2" name="Titel 1">
+            <a:extLst>
+              <a:ext uri="{FF2B5EF4-FFF2-40B4-BE49-F238E27FC236}">
+                <a16:creationId xmlns:a16="http://schemas.microsoft.com/office/drawing/2014/main" id="{49A48EBC-55D9-6D64-715F-AF6DEBF117C3}"/>
+              </a:ext>
+            </a:extLst>
+          </p:cNvPr>
+          <p:cNvSpPr>
+            <a:spLocks noGrp="1"/>
+          </p:cNvSpPr>
+          <p:nvPr>
+            <p:ph type="title"/>
+          </p:nvPr>
+        </p:nvSpPr>
+        <p:spPr/>
+        <p:txBody>
+          <a:bodyPr/>
+          <a:lstStyle/>
+          <a:p>
+            <a:r>
+              <a:rPr lang="de-DE" cap="none" dirty="0"/>
+              <a:t>Release- und </a:t>
+            </a:r>
+            <a:r>
+              <a:rPr lang="de-DE" cap="none" dirty="0" err="1"/>
+              <a:t>Tagged</a:t>
+            </a:r>
+            <a:r>
+              <a:rPr lang="de-DE" cap="none" dirty="0"/>
+              <a:t>-Images</a:t>
+            </a:r>
+            <a:endParaRPr lang="de-DE" dirty="0"/>
+          </a:p>
+        </p:txBody>
+      </p:sp>
+      <p:sp>
+        <p:nvSpPr>
+          <p:cNvPr id="3" name="Inhaltsplatzhalter 2">
+            <a:extLst>
+              <a:ext uri="{FF2B5EF4-FFF2-40B4-BE49-F238E27FC236}">
+                <a16:creationId xmlns:a16="http://schemas.microsoft.com/office/drawing/2014/main" id="{7B404127-ED2B-6905-BDD1-3C60D11A2A7C}"/>
+              </a:ext>
+            </a:extLst>
+          </p:cNvPr>
+          <p:cNvSpPr>
+            <a:spLocks noGrp="1"/>
+          </p:cNvSpPr>
+          <p:nvPr>
+            <p:ph idx="1"/>
+          </p:nvPr>
+        </p:nvSpPr>
+        <p:spPr/>
+        <p:txBody>
+          <a:bodyPr/>
+          <a:lstStyle/>
+          <a:p>
+            <a:pPr marL="0" indent="0">
+              <a:buNone/>
+            </a:pPr>
+            <a:r>
+              <a:rPr lang="de-DE" sz="2000" b="1" dirty="0">
+                <a:latin typeface="Consolas" panose="020B0609020204030204" pitchFamily="49" charset="0"/>
+              </a:rPr>
+              <a:t>.</a:t>
+            </a:r>
+            <a:r>
+              <a:rPr lang="de-DE" sz="2000" b="1" dirty="0" err="1">
+                <a:latin typeface="Consolas" panose="020B0609020204030204" pitchFamily="49" charset="0"/>
+              </a:rPr>
+              <a:t>gitlab-ci.yml</a:t>
+            </a:r>
+            <a:r>
+              <a:rPr lang="de-DE" sz="2000" b="1" dirty="0">
+                <a:latin typeface="Consolas" panose="020B0609020204030204" pitchFamily="49" charset="0"/>
+              </a:rPr>
+              <a:t> (4/4)</a:t>
+            </a:r>
+          </a:p>
+          <a:p>
+            <a:pPr marL="0" indent="0">
+              <a:buNone/>
+            </a:pPr>
+            <a:r>
+              <a:rPr lang="de-DE" sz="1400" dirty="0">
+                <a:latin typeface="Consolas" panose="020B0609020204030204" pitchFamily="49" charset="0"/>
+              </a:rPr>
+              <a:t>release-image:</a:t>
+            </a:r>
+          </a:p>
+          <a:p>
+            <a:pPr marL="0" indent="0">
+              <a:buNone/>
+            </a:pPr>
+            <a:r>
+              <a:rPr lang="de-DE" sz="1400" dirty="0">
+                <a:latin typeface="Consolas" panose="020B0609020204030204" pitchFamily="49" charset="0"/>
+              </a:rPr>
+              <a:t>  </a:t>
+            </a:r>
+            <a:r>
+              <a:rPr lang="de-DE" sz="1400" dirty="0" err="1">
+                <a:latin typeface="Consolas" panose="020B0609020204030204" pitchFamily="49" charset="0"/>
+              </a:rPr>
+              <a:t>stage</a:t>
+            </a:r>
+            <a:r>
+              <a:rPr lang="de-DE" sz="1400" dirty="0">
+                <a:latin typeface="Consolas" panose="020B0609020204030204" pitchFamily="49" charset="0"/>
+              </a:rPr>
+              <a:t>: release</a:t>
+            </a:r>
+          </a:p>
+          <a:p>
+            <a:pPr marL="0" indent="0">
+              <a:buNone/>
+            </a:pPr>
+            <a:r>
+              <a:rPr lang="de-DE" sz="1400" dirty="0">
+                <a:latin typeface="Consolas" panose="020B0609020204030204" pitchFamily="49" charset="0"/>
+              </a:rPr>
+              <a:t>  </a:t>
+            </a:r>
+            <a:r>
+              <a:rPr lang="de-DE" sz="1400" dirty="0" err="1">
+                <a:latin typeface="Consolas" panose="020B0609020204030204" pitchFamily="49" charset="0"/>
+              </a:rPr>
+              <a:t>script</a:t>
+            </a:r>
+            <a:r>
+              <a:rPr lang="de-DE" sz="1400" dirty="0">
+                <a:latin typeface="Consolas" panose="020B0609020204030204" pitchFamily="49" charset="0"/>
+              </a:rPr>
+              <a:t>:</a:t>
+            </a:r>
+          </a:p>
+          <a:p>
+            <a:pPr marL="0" indent="0">
+              <a:buNone/>
+            </a:pPr>
+            <a:r>
+              <a:rPr lang="de-DE" sz="1400" dirty="0">
+                <a:latin typeface="Consolas" panose="020B0609020204030204" pitchFamily="49" charset="0"/>
+              </a:rPr>
+              <a:t>    - </a:t>
+            </a:r>
+            <a:r>
+              <a:rPr lang="de-DE" sz="1400" dirty="0" err="1">
+                <a:latin typeface="Consolas" panose="020B0609020204030204" pitchFamily="49" charset="0"/>
+              </a:rPr>
+              <a:t>docker</a:t>
+            </a:r>
+            <a:r>
+              <a:rPr lang="de-DE" sz="1400" dirty="0">
+                <a:latin typeface="Consolas" panose="020B0609020204030204" pitchFamily="49" charset="0"/>
+              </a:rPr>
+              <a:t> pull $CONTAINER_TEST_IMAGE </a:t>
+            </a:r>
+            <a:r>
+              <a:rPr lang="de-DE" sz="1400" dirty="0">
+                <a:solidFill>
+                  <a:srgbClr val="008C5A"/>
+                </a:solidFill>
+                <a:latin typeface="Consolas" panose="020B0609020204030204" pitchFamily="49" charset="0"/>
+              </a:rPr>
+              <a:t># 2. Von den nachfolgenden Stages (bei Bedarf) </a:t>
+            </a:r>
+            <a:r>
+              <a:rPr lang="de-DE" sz="1400" dirty="0" err="1">
+                <a:solidFill>
+                  <a:srgbClr val="008C5A"/>
+                </a:solidFill>
+                <a:latin typeface="Consolas" panose="020B0609020204030204" pitchFamily="49" charset="0"/>
+              </a:rPr>
+              <a:t>gepulled</a:t>
+            </a:r>
+            <a:endParaRPr lang="de-DE" sz="1400" dirty="0">
+              <a:solidFill>
+                <a:srgbClr val="008C5A"/>
+              </a:solidFill>
+              <a:latin typeface="Consolas" panose="020B0609020204030204" pitchFamily="49" charset="0"/>
+            </a:endParaRPr>
+          </a:p>
+          <a:p>
+            <a:pPr marL="0" indent="0">
+              <a:buNone/>
+            </a:pPr>
+            <a:r>
+              <a:rPr lang="de-DE" sz="1400" dirty="0">
+                <a:latin typeface="Consolas" panose="020B0609020204030204" pitchFamily="49" charset="0"/>
+              </a:rPr>
+              <a:t>    - </a:t>
+            </a:r>
+            <a:r>
+              <a:rPr lang="de-DE" sz="1400" dirty="0" err="1">
+                <a:latin typeface="Consolas" panose="020B0609020204030204" pitchFamily="49" charset="0"/>
+              </a:rPr>
+              <a:t>docker</a:t>
+            </a:r>
+            <a:r>
+              <a:rPr lang="de-DE" sz="1400" dirty="0">
+                <a:latin typeface="Consolas" panose="020B0609020204030204" pitchFamily="49" charset="0"/>
+              </a:rPr>
+              <a:t> tag $CONTAINER_TEST_IMAGE $CONTAINER_RELEASE_IMAGE </a:t>
+            </a:r>
+            <a:r>
+              <a:rPr lang="de-DE" sz="1400" dirty="0">
+                <a:solidFill>
+                  <a:srgbClr val="008C5A"/>
+                </a:solidFill>
+                <a:latin typeface="Consolas" panose="020B0609020204030204" pitchFamily="49" charset="0"/>
+              </a:rPr>
+              <a:t># 4. Änderungen am </a:t>
+            </a:r>
+            <a:r>
+              <a:rPr lang="de-DE" sz="1400" dirty="0" err="1">
+                <a:solidFill>
+                  <a:srgbClr val="008C5A"/>
+                </a:solidFill>
+                <a:latin typeface="Consolas" panose="020B0609020204030204" pitchFamily="49" charset="0"/>
+              </a:rPr>
+              <a:t>main</a:t>
+            </a:r>
+            <a:r>
+              <a:rPr lang="de-DE" sz="1400" dirty="0">
+                <a:solidFill>
+                  <a:srgbClr val="008C5A"/>
+                </a:solidFill>
+                <a:latin typeface="Consolas" panose="020B0609020204030204" pitchFamily="49" charset="0"/>
+              </a:rPr>
+              <a:t> werden als </a:t>
+            </a:r>
+            <a:r>
+              <a:rPr lang="de-DE" sz="1400" dirty="0" err="1">
+                <a:solidFill>
+                  <a:srgbClr val="008C5A"/>
+                </a:solidFill>
+                <a:latin typeface="Consolas" panose="020B0609020204030204" pitchFamily="49" charset="0"/>
+              </a:rPr>
+              <a:t>latest</a:t>
+            </a:r>
+            <a:r>
+              <a:rPr lang="de-DE" sz="1400" dirty="0">
+                <a:solidFill>
+                  <a:srgbClr val="008C5A"/>
+                </a:solidFill>
+                <a:latin typeface="Consolas" panose="020B0609020204030204" pitchFamily="49" charset="0"/>
+              </a:rPr>
+              <a:t> </a:t>
+            </a:r>
+            <a:r>
+              <a:rPr lang="de-DE" sz="1400" dirty="0" err="1">
+                <a:solidFill>
+                  <a:srgbClr val="008C5A"/>
+                </a:solidFill>
+                <a:latin typeface="Consolas" panose="020B0609020204030204" pitchFamily="49" charset="0"/>
+              </a:rPr>
+              <a:t>getagged</a:t>
+            </a:r>
+            <a:endParaRPr lang="de-DE" sz="1400" dirty="0">
+              <a:solidFill>
+                <a:srgbClr val="008C5A"/>
+              </a:solidFill>
+              <a:latin typeface="Consolas" panose="020B0609020204030204" pitchFamily="49" charset="0"/>
+            </a:endParaRPr>
+          </a:p>
+          <a:p>
+            <a:pPr marL="0" indent="0">
+              <a:buNone/>
+            </a:pPr>
+            <a:r>
+              <a:rPr lang="de-DE" sz="1400" dirty="0">
+                <a:latin typeface="Consolas" panose="020B0609020204030204" pitchFamily="49" charset="0"/>
+              </a:rPr>
+              <a:t>    - </a:t>
+            </a:r>
+            <a:r>
+              <a:rPr lang="de-DE" sz="1400" dirty="0" err="1">
+                <a:latin typeface="Consolas" panose="020B0609020204030204" pitchFamily="49" charset="0"/>
+              </a:rPr>
+              <a:t>docker</a:t>
+            </a:r>
+            <a:r>
+              <a:rPr lang="de-DE" sz="1400" dirty="0">
+                <a:latin typeface="Consolas" panose="020B0609020204030204" pitchFamily="49" charset="0"/>
+              </a:rPr>
+              <a:t> push $CONTAINER_RELEASE_IMAGE</a:t>
+            </a:r>
+          </a:p>
+          <a:p>
+            <a:pPr marL="0" indent="0">
+              <a:buNone/>
+            </a:pPr>
+            <a:r>
+              <a:rPr lang="de-DE" sz="1400" dirty="0">
+                <a:latin typeface="Consolas" panose="020B0609020204030204" pitchFamily="49" charset="0"/>
+              </a:rPr>
+              <a:t>  </a:t>
+            </a:r>
+            <a:r>
+              <a:rPr lang="de-DE" sz="1400" dirty="0" err="1">
+                <a:latin typeface="Consolas" panose="020B0609020204030204" pitchFamily="49" charset="0"/>
+              </a:rPr>
+              <a:t>only</a:t>
+            </a:r>
+            <a:r>
+              <a:rPr lang="de-DE" sz="1400" dirty="0">
+                <a:latin typeface="Consolas" panose="020B0609020204030204" pitchFamily="49" charset="0"/>
+              </a:rPr>
+              <a:t>:</a:t>
+            </a:r>
+          </a:p>
+          <a:p>
+            <a:pPr marL="0" indent="0">
+              <a:buNone/>
+            </a:pPr>
+            <a:r>
+              <a:rPr lang="de-DE" sz="1400" dirty="0">
+                <a:latin typeface="Consolas" panose="020B0609020204030204" pitchFamily="49" charset="0"/>
+              </a:rPr>
+              <a:t>    - </a:t>
+            </a:r>
+            <a:r>
+              <a:rPr lang="de-DE" sz="1400" dirty="0" err="1">
+                <a:latin typeface="Consolas" panose="020B0609020204030204" pitchFamily="49" charset="0"/>
+              </a:rPr>
+              <a:t>main</a:t>
+            </a:r>
+            <a:endParaRPr lang="de-DE" sz="1400" dirty="0">
+              <a:latin typeface="Consolas" panose="020B0609020204030204" pitchFamily="49" charset="0"/>
+            </a:endParaRPr>
+          </a:p>
+          <a:p>
+            <a:pPr marL="0" indent="0">
+              <a:buNone/>
+            </a:pPr>
+            <a:endParaRPr lang="de-DE" sz="1400" dirty="0">
+              <a:latin typeface="Consolas" panose="020B0609020204030204" pitchFamily="49" charset="0"/>
+            </a:endParaRPr>
+          </a:p>
+          <a:p>
+            <a:pPr marL="0" indent="0">
+              <a:buNone/>
+            </a:pPr>
+            <a:r>
+              <a:rPr lang="de-DE" sz="1400" dirty="0">
+                <a:solidFill>
+                  <a:srgbClr val="008C5A"/>
+                </a:solidFill>
+                <a:latin typeface="Consolas" panose="020B0609020204030204" pitchFamily="49" charset="0"/>
+              </a:rPr>
+              <a:t># 5. </a:t>
+            </a:r>
+            <a:r>
+              <a:rPr lang="de-DE" sz="1400" dirty="0" err="1">
+                <a:solidFill>
+                  <a:srgbClr val="008C5A"/>
+                </a:solidFill>
+                <a:latin typeface="Consolas" panose="020B0609020204030204" pitchFamily="49" charset="0"/>
+              </a:rPr>
+              <a:t>Deployment</a:t>
+            </a:r>
+            <a:r>
+              <a:rPr lang="de-DE" sz="1400" dirty="0">
+                <a:solidFill>
+                  <a:srgbClr val="008C5A"/>
+                </a:solidFill>
+                <a:latin typeface="Consolas" panose="020B0609020204030204" pitchFamily="49" charset="0"/>
+              </a:rPr>
+              <a:t> über anwendungs-spezifisches Deploy-Skript</a:t>
+            </a:r>
+          </a:p>
+          <a:p>
+            <a:pPr marL="0" indent="0">
+              <a:buNone/>
+            </a:pPr>
+            <a:r>
+              <a:rPr lang="de-DE" sz="1400" dirty="0">
+                <a:latin typeface="Consolas" panose="020B0609020204030204" pitchFamily="49" charset="0"/>
+              </a:rPr>
+              <a:t>deploy:</a:t>
+            </a:r>
+          </a:p>
+          <a:p>
+            <a:pPr marL="0" indent="0">
+              <a:buNone/>
+            </a:pPr>
+            <a:r>
+              <a:rPr lang="de-DE" sz="1400" dirty="0">
+                <a:latin typeface="Consolas" panose="020B0609020204030204" pitchFamily="49" charset="0"/>
+              </a:rPr>
+              <a:t>  </a:t>
+            </a:r>
+            <a:r>
+              <a:rPr lang="de-DE" sz="1400" dirty="0" err="1">
+                <a:latin typeface="Consolas" panose="020B0609020204030204" pitchFamily="49" charset="0"/>
+              </a:rPr>
+              <a:t>stage</a:t>
+            </a:r>
+            <a:r>
+              <a:rPr lang="de-DE" sz="1400" dirty="0">
+                <a:latin typeface="Consolas" panose="020B0609020204030204" pitchFamily="49" charset="0"/>
+              </a:rPr>
+              <a:t>: deploy</a:t>
+            </a:r>
+          </a:p>
+          <a:p>
+            <a:pPr marL="0" indent="0">
+              <a:buNone/>
+            </a:pPr>
+            <a:r>
+              <a:rPr lang="de-DE" sz="1400" dirty="0">
+                <a:latin typeface="Consolas" panose="020B0609020204030204" pitchFamily="49" charset="0"/>
+              </a:rPr>
+              <a:t>  </a:t>
+            </a:r>
+            <a:r>
+              <a:rPr lang="de-DE" sz="1400" dirty="0" err="1">
+                <a:latin typeface="Consolas" panose="020B0609020204030204" pitchFamily="49" charset="0"/>
+              </a:rPr>
+              <a:t>script</a:t>
+            </a:r>
+            <a:r>
+              <a:rPr lang="de-DE" sz="1400" dirty="0">
+                <a:latin typeface="Consolas" panose="020B0609020204030204" pitchFamily="49" charset="0"/>
+              </a:rPr>
+              <a:t>:</a:t>
+            </a:r>
+          </a:p>
+          <a:p>
+            <a:pPr marL="0" indent="0">
+              <a:buNone/>
+            </a:pPr>
+            <a:r>
+              <a:rPr lang="de-DE" sz="1400" dirty="0">
+                <a:latin typeface="Consolas" panose="020B0609020204030204" pitchFamily="49" charset="0"/>
+              </a:rPr>
+              <a:t>    - ./deploy.sh</a:t>
+            </a:r>
+          </a:p>
+          <a:p>
+            <a:pPr marL="0" indent="0">
+              <a:buNone/>
+            </a:pPr>
+            <a:r>
+              <a:rPr lang="de-DE" sz="1400" dirty="0">
+                <a:latin typeface="Consolas" panose="020B0609020204030204" pitchFamily="49" charset="0"/>
+              </a:rPr>
+              <a:t>  </a:t>
+            </a:r>
+            <a:r>
+              <a:rPr lang="de-DE" sz="1400" dirty="0" err="1">
+                <a:latin typeface="Consolas" panose="020B0609020204030204" pitchFamily="49" charset="0"/>
+              </a:rPr>
+              <a:t>only</a:t>
+            </a:r>
+            <a:r>
+              <a:rPr lang="de-DE" sz="1400" dirty="0">
+                <a:latin typeface="Consolas" panose="020B0609020204030204" pitchFamily="49" charset="0"/>
+              </a:rPr>
+              <a:t>:</a:t>
+            </a:r>
+          </a:p>
+          <a:p>
+            <a:pPr marL="0" indent="0">
+              <a:buNone/>
+            </a:pPr>
+            <a:r>
+              <a:rPr lang="de-DE" sz="1400" dirty="0">
+                <a:latin typeface="Consolas" panose="020B0609020204030204" pitchFamily="49" charset="0"/>
+              </a:rPr>
+              <a:t>    - </a:t>
+            </a:r>
+            <a:r>
+              <a:rPr lang="de-DE" sz="1400" dirty="0" err="1">
+                <a:latin typeface="Consolas" panose="020B0609020204030204" pitchFamily="49" charset="0"/>
+              </a:rPr>
+              <a:t>main</a:t>
+            </a:r>
+            <a:endParaRPr lang="de-DE" sz="1400" dirty="0">
+              <a:latin typeface="Consolas" panose="020B0609020204030204" pitchFamily="49" charset="0"/>
+            </a:endParaRPr>
+          </a:p>
+          <a:p>
+            <a:pPr marL="0" indent="0">
+              <a:buNone/>
+            </a:pPr>
+            <a:r>
+              <a:rPr lang="de-DE" sz="1400" dirty="0">
+                <a:latin typeface="Consolas" panose="020B0609020204030204" pitchFamily="49" charset="0"/>
+              </a:rPr>
+              <a:t>  </a:t>
+            </a:r>
+            <a:r>
+              <a:rPr lang="de-DE" sz="1400" dirty="0" err="1">
+                <a:latin typeface="Consolas" panose="020B0609020204030204" pitchFamily="49" charset="0"/>
+              </a:rPr>
+              <a:t>environment</a:t>
+            </a:r>
+            <a:r>
+              <a:rPr lang="de-DE" sz="1400" dirty="0">
+                <a:latin typeface="Consolas" panose="020B0609020204030204" pitchFamily="49" charset="0"/>
+              </a:rPr>
+              <a:t>: </a:t>
+            </a:r>
+            <a:r>
+              <a:rPr lang="de-DE" sz="1400" dirty="0" err="1">
+                <a:latin typeface="Consolas" panose="020B0609020204030204" pitchFamily="49" charset="0"/>
+              </a:rPr>
+              <a:t>production</a:t>
+            </a:r>
+            <a:endParaRPr lang="de-DE" sz="1400" dirty="0">
+              <a:latin typeface="Consolas" panose="020B0609020204030204" pitchFamily="49" charset="0"/>
+            </a:endParaRPr>
+          </a:p>
+          <a:p>
+            <a:pPr marL="0" indent="0">
+              <a:buNone/>
+            </a:pPr>
+            <a:endParaRPr lang="de-DE" sz="1600" dirty="0">
+              <a:latin typeface="Consolas" panose="020B0609020204030204" pitchFamily="49" charset="0"/>
+            </a:endParaRPr>
+          </a:p>
+          <a:p>
+            <a:pPr marL="0" indent="0">
+              <a:buNone/>
+            </a:pPr>
+            <a:endParaRPr lang="de-DE" sz="1600" dirty="0">
+              <a:latin typeface="Consolas" panose="020B0609020204030204" pitchFamily="49" charset="0"/>
+            </a:endParaRPr>
+          </a:p>
+          <a:p>
+            <a:pPr marL="0" indent="0">
+              <a:buNone/>
+            </a:pPr>
+            <a:endParaRPr lang="de-DE" sz="1600" dirty="0">
+              <a:latin typeface="Consolas" panose="020B0609020204030204" pitchFamily="49" charset="0"/>
+            </a:endParaRPr>
+          </a:p>
+        </p:txBody>
+      </p:sp>
+    </p:spTree>
+    <p:extLst>
+      <p:ext uri="{BB962C8B-B14F-4D97-AF65-F5344CB8AC3E}">
+        <p14:creationId xmlns:p14="http://schemas.microsoft.com/office/powerpoint/2010/main" val="2664526633"/>
+      </p:ext>
+    </p:extLst>
+  </p:cSld>
+  <p:clrMapOvr>
+    <a:masterClrMapping/>
+  </p:clrMapOvr>
+</p:sld>
+</file>
+
 <file path=ppt/slides/slide2.xml><?xml version="1.0" encoding="utf-8"?>
 <p:sld xmlns:a="http://schemas.openxmlformats.org/drawingml/2006/main" xmlns:r="http://schemas.openxmlformats.org/officeDocument/2006/relationships" xmlns:p="http://schemas.openxmlformats.org/presentationml/2006/main">
   <p:cSld>
@@ -3987,16 +4650,6 @@
             <a:r>
               <a:rPr lang="de-DE" altLang="de-DE" sz="1400" dirty="0"/>
               <a:t> &amp; Verwaltung von Konfiguration</a:t>
-            </a:r>
-          </a:p>
-          <a:p>
-            <a:pPr lvl="1">
-              <a:buFont typeface="Arial" panose="020B0604020202020204" pitchFamily="34" charset="0"/>
-              <a:buChar char="•"/>
-            </a:pPr>
-            <a:r>
-              <a:rPr lang="de-DE" altLang="de-DE" sz="1400" dirty="0"/>
-              <a:t>Abschlussübung und Diskussion</a:t>
             </a:r>
           </a:p>
           <a:p>
@@ -4394,16 +5047,6 @@
               <a:buFont typeface="Arial" panose="020B0604020202020204" pitchFamily="34" charset="0"/>
               <a:buChar char="•"/>
             </a:pPr>
-            <a:r>
-              <a:rPr lang="de-DE" altLang="de-DE" sz="1400" u="sng" dirty="0"/>
-              <a:t>Abschlussübung und Diskussion</a:t>
-            </a:r>
-          </a:p>
-          <a:p>
-            <a:pPr lvl="1">
-              <a:buFont typeface="Arial" panose="020B0604020202020204" pitchFamily="34" charset="0"/>
-              <a:buChar char="•"/>
-            </a:pPr>
             <a:endParaRPr lang="de-DE" altLang="de-DE" sz="1400" dirty="0"/>
           </a:p>
         </p:txBody>
@@ -4444,7 +5087,7 @@
     </p:spTree>
     <p:extLst>
       <p:ext uri="{BB962C8B-B14F-4D97-AF65-F5344CB8AC3E}">
-        <p14:creationId xmlns:p14="http://schemas.microsoft.com/office/powerpoint/2010/main" val="3320683065"/>
+        <p14:creationId xmlns:p14="http://schemas.microsoft.com/office/powerpoint/2010/main" val="3071277897"/>
       </p:ext>
     </p:extLst>
   </p:cSld>
@@ -4508,7 +5151,10 @@
           <a:bodyPr/>
           <a:lstStyle/>
           <a:p>
-            <a:endParaRPr lang="de-DE" dirty="0"/>
+            <a:r>
+              <a:rPr lang="de-DE" dirty="0"/>
+              <a:t>Grundlagen von</a:t>
+            </a:r>
           </a:p>
         </p:txBody>
       </p:sp>
@@ -4516,6 +5162,1851 @@
     <p:extLst>
       <p:ext uri="{BB962C8B-B14F-4D97-AF65-F5344CB8AC3E}">
         <p14:creationId xmlns:p14="http://schemas.microsoft.com/office/powerpoint/2010/main" val="2809021556"/>
+      </p:ext>
+    </p:extLst>
+  </p:cSld>
+  <p:clrMapOvr>
+    <a:masterClrMapping/>
+  </p:clrMapOvr>
+</p:sld>
+</file>
+
+<file path=ppt/slides/slide5.xml><?xml version="1.0" encoding="utf-8"?>
+<p:sld xmlns:a="http://schemas.openxmlformats.org/drawingml/2006/main" xmlns:r="http://schemas.openxmlformats.org/officeDocument/2006/relationships" xmlns:p="http://schemas.openxmlformats.org/presentationml/2006/main">
+  <p:cSld>
+    <p:spTree>
+      <p:nvGrpSpPr>
+        <p:cNvPr id="1" name=""/>
+        <p:cNvGrpSpPr/>
+        <p:nvPr/>
+      </p:nvGrpSpPr>
+      <p:grpSpPr>
+        <a:xfrm>
+          <a:off x="0" y="0"/>
+          <a:ext cx="0" cy="0"/>
+          <a:chOff x="0" y="0"/>
+          <a:chExt cx="0" cy="0"/>
+        </a:xfrm>
+      </p:grpSpPr>
+      <p:sp>
+        <p:nvSpPr>
+          <p:cNvPr id="2" name="Titel 1">
+            <a:extLst>
+              <a:ext uri="{FF2B5EF4-FFF2-40B4-BE49-F238E27FC236}">
+                <a16:creationId xmlns:a16="http://schemas.microsoft.com/office/drawing/2014/main" id="{0A6ADA43-34C1-347C-FD8E-BF87A5A77FC5}"/>
+              </a:ext>
+            </a:extLst>
+          </p:cNvPr>
+          <p:cNvSpPr>
+            <a:spLocks noGrp="1"/>
+          </p:cNvSpPr>
+          <p:nvPr>
+            <p:ph type="title"/>
+          </p:nvPr>
+        </p:nvSpPr>
+        <p:spPr/>
+        <p:txBody>
+          <a:bodyPr/>
+          <a:lstStyle/>
+          <a:p>
+            <a:r>
+              <a:rPr lang="de-DE" cap="none" dirty="0"/>
+              <a:t>Release- und </a:t>
+            </a:r>
+            <a:r>
+              <a:rPr lang="de-DE" cap="none" dirty="0" err="1"/>
+              <a:t>Tagged</a:t>
+            </a:r>
+            <a:r>
+              <a:rPr lang="de-DE" cap="none" dirty="0"/>
+              <a:t>-Images</a:t>
+            </a:r>
+            <a:endParaRPr lang="de-DE" dirty="0"/>
+          </a:p>
+        </p:txBody>
+      </p:sp>
+      <p:sp>
+        <p:nvSpPr>
+          <p:cNvPr id="3" name="Inhaltsplatzhalter 2">
+            <a:extLst>
+              <a:ext uri="{FF2B5EF4-FFF2-40B4-BE49-F238E27FC236}">
+                <a16:creationId xmlns:a16="http://schemas.microsoft.com/office/drawing/2014/main" id="{4D911ADB-7C0F-98E1-85DA-1C884339CE08}"/>
+              </a:ext>
+            </a:extLst>
+          </p:cNvPr>
+          <p:cNvSpPr>
+            <a:spLocks noGrp="1"/>
+          </p:cNvSpPr>
+          <p:nvPr>
+            <p:ph idx="1"/>
+          </p:nvPr>
+        </p:nvSpPr>
+        <p:spPr/>
+        <p:txBody>
+          <a:bodyPr/>
+          <a:lstStyle/>
+          <a:p>
+            <a:pPr marL="0" indent="0">
+              <a:buNone/>
+            </a:pPr>
+            <a:r>
+              <a:rPr lang="de-DE" b="1" dirty="0"/>
+              <a:t>Aufgabe: Pipeline mit vier Stages</a:t>
+            </a:r>
+          </a:p>
+          <a:p>
+            <a:pPr marL="457200" indent="-457200">
+              <a:buFont typeface="+mj-lt"/>
+              <a:buAutoNum type="arabicPeriod"/>
+            </a:pPr>
+            <a:r>
+              <a:rPr lang="de-DE" b="1" dirty="0"/>
+              <a:t>Ziel: </a:t>
+            </a:r>
+            <a:r>
+              <a:rPr lang="de-DE" dirty="0"/>
+              <a:t>Tiefgehendes CI/CD Verständnis</a:t>
+            </a:r>
+          </a:p>
+          <a:p>
+            <a:pPr marL="457200" indent="-457200">
+              <a:buFont typeface="+mj-lt"/>
+              <a:buAutoNum type="arabicPeriod"/>
+            </a:pPr>
+            <a:r>
+              <a:rPr lang="de-DE" b="1" dirty="0"/>
+              <a:t>Schritte:</a:t>
+            </a:r>
+          </a:p>
+          <a:p>
+            <a:pPr marL="857250" lvl="1" indent="-457200">
+              <a:buFont typeface="Arial" panose="020B0604020202020204" pitchFamily="34" charset="0"/>
+              <a:buChar char="•"/>
+            </a:pPr>
+            <a:r>
+              <a:rPr lang="de-DE" dirty="0" err="1"/>
+              <a:t>Build</a:t>
+            </a:r>
+            <a:r>
+              <a:rPr lang="de-DE" dirty="0"/>
+              <a:t> wird in die Container Registry </a:t>
+            </a:r>
+            <a:r>
+              <a:rPr lang="de-DE" dirty="0" err="1"/>
+              <a:t>gepushed</a:t>
+            </a:r>
+            <a:endParaRPr lang="de-DE" dirty="0"/>
+          </a:p>
+          <a:p>
+            <a:pPr marL="857250" lvl="1" indent="-457200">
+              <a:buFont typeface="Arial" panose="020B0604020202020204" pitchFamily="34" charset="0"/>
+              <a:buChar char="•"/>
+            </a:pPr>
+            <a:r>
+              <a:rPr lang="de-DE" dirty="0"/>
+              <a:t>Von den nachfolgenden Stages (bei Bedarf) </a:t>
+            </a:r>
+            <a:r>
+              <a:rPr lang="de-DE" dirty="0" err="1"/>
+              <a:t>gepulled</a:t>
+            </a:r>
+            <a:endParaRPr lang="de-DE" dirty="0"/>
+          </a:p>
+          <a:p>
+            <a:pPr marL="857250" lvl="1" indent="-457200">
+              <a:buFont typeface="Arial" panose="020B0604020202020204" pitchFamily="34" charset="0"/>
+              <a:buChar char="•"/>
+            </a:pPr>
+            <a:r>
+              <a:rPr lang="de-DE" dirty="0"/>
+              <a:t>Zwei </a:t>
+            </a:r>
+            <a:r>
+              <a:rPr lang="de-DE" dirty="0" err="1"/>
+              <a:t>paralell</a:t>
+            </a:r>
+            <a:r>
+              <a:rPr lang="de-DE" dirty="0"/>
+              <a:t> laufende Tests</a:t>
+            </a:r>
+          </a:p>
+          <a:p>
+            <a:pPr marL="857250" lvl="1" indent="-457200">
+              <a:buFont typeface="Arial" panose="020B0604020202020204" pitchFamily="34" charset="0"/>
+              <a:buChar char="•"/>
+            </a:pPr>
+            <a:r>
+              <a:rPr lang="de-DE" dirty="0"/>
+              <a:t>Änderungen am </a:t>
+            </a:r>
+            <a:r>
+              <a:rPr lang="de-DE" dirty="0" err="1"/>
+              <a:t>main</a:t>
+            </a:r>
+            <a:r>
+              <a:rPr lang="de-DE" dirty="0"/>
+              <a:t> werden als </a:t>
+            </a:r>
+            <a:r>
+              <a:rPr lang="de-DE" dirty="0" err="1"/>
+              <a:t>latest</a:t>
+            </a:r>
+            <a:r>
+              <a:rPr lang="de-DE" dirty="0"/>
+              <a:t> </a:t>
+            </a:r>
+            <a:r>
+              <a:rPr lang="de-DE" dirty="0" err="1"/>
+              <a:t>getagged</a:t>
+            </a:r>
+            <a:endParaRPr lang="de-DE" dirty="0"/>
+          </a:p>
+          <a:p>
+            <a:pPr marL="857250" lvl="1" indent="-457200">
+              <a:buFont typeface="Arial" panose="020B0604020202020204" pitchFamily="34" charset="0"/>
+              <a:buChar char="•"/>
+            </a:pPr>
+            <a:r>
+              <a:rPr lang="de-DE" dirty="0" err="1"/>
+              <a:t>Deployment</a:t>
+            </a:r>
+            <a:r>
+              <a:rPr lang="de-DE" dirty="0"/>
+              <a:t> über anwendungs-spezifisches Deploy-Skript</a:t>
+            </a:r>
+          </a:p>
+          <a:p>
+            <a:pPr marL="857250" lvl="1" indent="-457200">
+              <a:buFont typeface="Arial" panose="020B0604020202020204" pitchFamily="34" charset="0"/>
+              <a:buChar char="•"/>
+            </a:pPr>
+            <a:endParaRPr lang="de-DE" dirty="0"/>
+          </a:p>
+          <a:p>
+            <a:pPr marL="857250" lvl="1" indent="-457200">
+              <a:buFont typeface="Arial" panose="020B0604020202020204" pitchFamily="34" charset="0"/>
+              <a:buChar char="•"/>
+            </a:pPr>
+            <a:endParaRPr lang="de-DE" dirty="0"/>
+          </a:p>
+          <a:p>
+            <a:pPr marL="857250" lvl="1" indent="-457200">
+              <a:buFont typeface="Arial" panose="020B0604020202020204" pitchFamily="34" charset="0"/>
+              <a:buChar char="•"/>
+            </a:pPr>
+            <a:endParaRPr lang="de-DE" dirty="0"/>
+          </a:p>
+        </p:txBody>
+      </p:sp>
+    </p:spTree>
+    <p:extLst>
+      <p:ext uri="{BB962C8B-B14F-4D97-AF65-F5344CB8AC3E}">
+        <p14:creationId xmlns:p14="http://schemas.microsoft.com/office/powerpoint/2010/main" val="1582550262"/>
+      </p:ext>
+    </p:extLst>
+  </p:cSld>
+  <p:clrMapOvr>
+    <a:masterClrMapping/>
+  </p:clrMapOvr>
+</p:sld>
+</file>
+
+<file path=ppt/slides/slide6.xml><?xml version="1.0" encoding="utf-8"?>
+<p:sld xmlns:a="http://schemas.openxmlformats.org/drawingml/2006/main" xmlns:r="http://schemas.openxmlformats.org/officeDocument/2006/relationships" xmlns:p="http://schemas.openxmlformats.org/presentationml/2006/main">
+  <p:cSld>
+    <p:spTree>
+      <p:nvGrpSpPr>
+        <p:cNvPr id="1" name=""/>
+        <p:cNvGrpSpPr/>
+        <p:nvPr/>
+      </p:nvGrpSpPr>
+      <p:grpSpPr>
+        <a:xfrm>
+          <a:off x="0" y="0"/>
+          <a:ext cx="0" cy="0"/>
+          <a:chOff x="0" y="0"/>
+          <a:chExt cx="0" cy="0"/>
+        </a:xfrm>
+      </p:grpSpPr>
+      <p:sp>
+        <p:nvSpPr>
+          <p:cNvPr id="2" name="Titel 1">
+            <a:extLst>
+              <a:ext uri="{FF2B5EF4-FFF2-40B4-BE49-F238E27FC236}">
+                <a16:creationId xmlns:a16="http://schemas.microsoft.com/office/drawing/2014/main" id="{49A48EBC-55D9-6D64-715F-AF6DEBF117C3}"/>
+              </a:ext>
+            </a:extLst>
+          </p:cNvPr>
+          <p:cNvSpPr>
+            <a:spLocks noGrp="1"/>
+          </p:cNvSpPr>
+          <p:nvPr>
+            <p:ph type="title"/>
+          </p:nvPr>
+        </p:nvSpPr>
+        <p:spPr/>
+        <p:txBody>
+          <a:bodyPr/>
+          <a:lstStyle/>
+          <a:p>
+            <a:r>
+              <a:rPr lang="de-DE" cap="none" dirty="0"/>
+              <a:t>Release- und </a:t>
+            </a:r>
+            <a:r>
+              <a:rPr lang="de-DE" cap="none" dirty="0" err="1"/>
+              <a:t>Tagged</a:t>
+            </a:r>
+            <a:r>
+              <a:rPr lang="de-DE" cap="none" dirty="0"/>
+              <a:t>-Images</a:t>
+            </a:r>
+            <a:endParaRPr lang="de-DE" dirty="0"/>
+          </a:p>
+        </p:txBody>
+      </p:sp>
+      <p:sp>
+        <p:nvSpPr>
+          <p:cNvPr id="3" name="Inhaltsplatzhalter 2">
+            <a:extLst>
+              <a:ext uri="{FF2B5EF4-FFF2-40B4-BE49-F238E27FC236}">
+                <a16:creationId xmlns:a16="http://schemas.microsoft.com/office/drawing/2014/main" id="{7B404127-ED2B-6905-BDD1-3C60D11A2A7C}"/>
+              </a:ext>
+            </a:extLst>
+          </p:cNvPr>
+          <p:cNvSpPr>
+            <a:spLocks noGrp="1"/>
+          </p:cNvSpPr>
+          <p:nvPr>
+            <p:ph idx="1"/>
+          </p:nvPr>
+        </p:nvSpPr>
+        <p:spPr/>
+        <p:txBody>
+          <a:bodyPr/>
+          <a:lstStyle/>
+          <a:p>
+            <a:pPr marL="0" indent="0">
+              <a:buNone/>
+            </a:pPr>
+            <a:r>
+              <a:rPr lang="de-DE" b="1" dirty="0"/>
+              <a:t>Pipeline mit vier Stages (… auf vier Slides </a:t>
+            </a:r>
+            <a:r>
+              <a:rPr lang="de-DE" b="1" dirty="0">
+                <a:sym typeface="Wingdings" panose="05000000000000000000" pitchFamily="2" charset="2"/>
+              </a:rPr>
+              <a:t>)</a:t>
+            </a:r>
+            <a:endParaRPr lang="de-DE" b="1" dirty="0"/>
+          </a:p>
+          <a:p>
+            <a:pPr marL="457200" indent="-457200">
+              <a:buFont typeface="+mj-lt"/>
+              <a:buAutoNum type="arabicPeriod"/>
+            </a:pPr>
+            <a:r>
+              <a:rPr lang="de-DE" dirty="0" err="1"/>
+              <a:t>Build</a:t>
+            </a:r>
+            <a:r>
+              <a:rPr lang="de-DE" dirty="0"/>
+              <a:t> wird in die Container Registry </a:t>
+            </a:r>
+            <a:r>
+              <a:rPr lang="de-DE" dirty="0" err="1"/>
+              <a:t>gepushed</a:t>
+            </a:r>
+            <a:endParaRPr lang="de-DE" dirty="0"/>
+          </a:p>
+          <a:p>
+            <a:pPr marL="457200" indent="-457200">
+              <a:buFont typeface="+mj-lt"/>
+              <a:buAutoNum type="arabicPeriod"/>
+            </a:pPr>
+            <a:r>
+              <a:rPr lang="de-DE" dirty="0"/>
+              <a:t>Von den nachfolgenden Stages (bei Bedarf) </a:t>
+            </a:r>
+            <a:r>
+              <a:rPr lang="de-DE" dirty="0" err="1"/>
+              <a:t>gepulled</a:t>
+            </a:r>
+            <a:endParaRPr lang="de-DE" dirty="0"/>
+          </a:p>
+          <a:p>
+            <a:pPr marL="457200" indent="-457200">
+              <a:buFont typeface="+mj-lt"/>
+              <a:buAutoNum type="arabicPeriod"/>
+            </a:pPr>
+            <a:r>
+              <a:rPr lang="de-DE" dirty="0"/>
+              <a:t>Zwei </a:t>
+            </a:r>
+            <a:r>
+              <a:rPr lang="de-DE" dirty="0" err="1"/>
+              <a:t>paralell</a:t>
+            </a:r>
+            <a:r>
+              <a:rPr lang="de-DE" dirty="0"/>
+              <a:t> laufende Tests</a:t>
+            </a:r>
+          </a:p>
+          <a:p>
+            <a:pPr marL="457200" indent="-457200">
+              <a:buFont typeface="+mj-lt"/>
+              <a:buAutoNum type="arabicPeriod"/>
+            </a:pPr>
+            <a:r>
+              <a:rPr lang="de-DE" dirty="0"/>
+              <a:t>Änderungen am </a:t>
+            </a:r>
+            <a:r>
+              <a:rPr lang="de-DE" dirty="0" err="1">
+                <a:latin typeface="Consolas" panose="020B0609020204030204" pitchFamily="49" charset="0"/>
+              </a:rPr>
+              <a:t>main</a:t>
+            </a:r>
+            <a:r>
+              <a:rPr lang="de-DE" dirty="0"/>
+              <a:t> werden als </a:t>
+            </a:r>
+            <a:r>
+              <a:rPr lang="de-DE" dirty="0" err="1">
+                <a:latin typeface="Consolas" panose="020B0609020204030204" pitchFamily="49" charset="0"/>
+              </a:rPr>
+              <a:t>latest</a:t>
+            </a:r>
+            <a:r>
+              <a:rPr lang="de-DE" dirty="0"/>
+              <a:t> </a:t>
+            </a:r>
+            <a:r>
+              <a:rPr lang="de-DE" dirty="0" err="1"/>
+              <a:t>getagged</a:t>
+            </a:r>
+            <a:endParaRPr lang="de-DE" dirty="0"/>
+          </a:p>
+          <a:p>
+            <a:pPr marL="457200" indent="-457200">
+              <a:buFont typeface="+mj-lt"/>
+              <a:buAutoNum type="arabicPeriod"/>
+            </a:pPr>
+            <a:r>
+              <a:rPr lang="de-DE" dirty="0" err="1"/>
+              <a:t>Deployment</a:t>
+            </a:r>
+            <a:r>
+              <a:rPr lang="de-DE" dirty="0"/>
+              <a:t> über anwendungs-spezifisches Deploy-Skript</a:t>
+            </a:r>
+          </a:p>
+          <a:p>
+            <a:pPr>
+              <a:buFont typeface="Arial" panose="020B0604020202020204" pitchFamily="34" charset="0"/>
+              <a:buChar char="•"/>
+            </a:pPr>
+            <a:endParaRPr lang="de-DE" dirty="0"/>
+          </a:p>
+          <a:p>
+            <a:pPr>
+              <a:buFont typeface="Arial" panose="020B0604020202020204" pitchFamily="34" charset="0"/>
+              <a:buChar char="•"/>
+            </a:pPr>
+            <a:endParaRPr lang="de-DE" dirty="0"/>
+          </a:p>
+        </p:txBody>
+      </p:sp>
+    </p:spTree>
+    <p:extLst>
+      <p:ext uri="{BB962C8B-B14F-4D97-AF65-F5344CB8AC3E}">
+        <p14:creationId xmlns:p14="http://schemas.microsoft.com/office/powerpoint/2010/main" val="4283580811"/>
+      </p:ext>
+    </p:extLst>
+  </p:cSld>
+  <p:clrMapOvr>
+    <a:masterClrMapping/>
+  </p:clrMapOvr>
+</p:sld>
+</file>
+
+<file path=ppt/slides/slide7.xml><?xml version="1.0" encoding="utf-8"?>
+<p:sld xmlns:a="http://schemas.openxmlformats.org/drawingml/2006/main" xmlns:r="http://schemas.openxmlformats.org/officeDocument/2006/relationships" xmlns:p="http://schemas.openxmlformats.org/presentationml/2006/main">
+  <p:cSld>
+    <p:spTree>
+      <p:nvGrpSpPr>
+        <p:cNvPr id="1" name=""/>
+        <p:cNvGrpSpPr/>
+        <p:nvPr/>
+      </p:nvGrpSpPr>
+      <p:grpSpPr>
+        <a:xfrm>
+          <a:off x="0" y="0"/>
+          <a:ext cx="0" cy="0"/>
+          <a:chOff x="0" y="0"/>
+          <a:chExt cx="0" cy="0"/>
+        </a:xfrm>
+      </p:grpSpPr>
+      <p:sp>
+        <p:nvSpPr>
+          <p:cNvPr id="2" name="Titel 1">
+            <a:extLst>
+              <a:ext uri="{FF2B5EF4-FFF2-40B4-BE49-F238E27FC236}">
+                <a16:creationId xmlns:a16="http://schemas.microsoft.com/office/drawing/2014/main" id="{49A48EBC-55D9-6D64-715F-AF6DEBF117C3}"/>
+              </a:ext>
+            </a:extLst>
+          </p:cNvPr>
+          <p:cNvSpPr>
+            <a:spLocks noGrp="1"/>
+          </p:cNvSpPr>
+          <p:nvPr>
+            <p:ph type="title"/>
+          </p:nvPr>
+        </p:nvSpPr>
+        <p:spPr/>
+        <p:txBody>
+          <a:bodyPr/>
+          <a:lstStyle/>
+          <a:p>
+            <a:r>
+              <a:rPr lang="de-DE" cap="none" dirty="0"/>
+              <a:t>Release- und </a:t>
+            </a:r>
+            <a:r>
+              <a:rPr lang="de-DE" cap="none" dirty="0" err="1"/>
+              <a:t>Tagged</a:t>
+            </a:r>
+            <a:r>
+              <a:rPr lang="de-DE" cap="none" dirty="0"/>
+              <a:t>-Images</a:t>
+            </a:r>
+            <a:endParaRPr lang="de-DE" dirty="0"/>
+          </a:p>
+        </p:txBody>
+      </p:sp>
+      <p:sp>
+        <p:nvSpPr>
+          <p:cNvPr id="3" name="Inhaltsplatzhalter 2">
+            <a:extLst>
+              <a:ext uri="{FF2B5EF4-FFF2-40B4-BE49-F238E27FC236}">
+                <a16:creationId xmlns:a16="http://schemas.microsoft.com/office/drawing/2014/main" id="{7B404127-ED2B-6905-BDD1-3C60D11A2A7C}"/>
+              </a:ext>
+            </a:extLst>
+          </p:cNvPr>
+          <p:cNvSpPr>
+            <a:spLocks noGrp="1"/>
+          </p:cNvSpPr>
+          <p:nvPr>
+            <p:ph idx="1"/>
+          </p:nvPr>
+        </p:nvSpPr>
+        <p:spPr/>
+        <p:txBody>
+          <a:bodyPr/>
+          <a:lstStyle/>
+          <a:p>
+            <a:pPr marL="0" indent="0">
+              <a:buNone/>
+            </a:pPr>
+            <a:r>
+              <a:rPr lang="de-DE" sz="2000" b="1" dirty="0">
+                <a:latin typeface="Consolas" panose="020B0609020204030204" pitchFamily="49" charset="0"/>
+              </a:rPr>
+              <a:t>.</a:t>
+            </a:r>
+            <a:r>
+              <a:rPr lang="de-DE" sz="2000" b="1" dirty="0" err="1">
+                <a:latin typeface="Consolas" panose="020B0609020204030204" pitchFamily="49" charset="0"/>
+              </a:rPr>
+              <a:t>gitlab-ci.yml</a:t>
+            </a:r>
+            <a:r>
+              <a:rPr lang="de-DE" sz="2000" b="1" dirty="0">
+                <a:latin typeface="Consolas" panose="020B0609020204030204" pitchFamily="49" charset="0"/>
+              </a:rPr>
+              <a:t> (1/4)</a:t>
+            </a:r>
+          </a:p>
+          <a:p>
+            <a:pPr marL="0" indent="0">
+              <a:buNone/>
+            </a:pPr>
+            <a:r>
+              <a:rPr lang="de-DE" sz="1800" dirty="0" err="1">
+                <a:latin typeface="Consolas" panose="020B0609020204030204" pitchFamily="49" charset="0"/>
+              </a:rPr>
+              <a:t>default</a:t>
+            </a:r>
+            <a:r>
+              <a:rPr lang="de-DE" sz="1800" dirty="0">
+                <a:latin typeface="Consolas" panose="020B0609020204030204" pitchFamily="49" charset="0"/>
+              </a:rPr>
+              <a:t>:</a:t>
+            </a:r>
+          </a:p>
+          <a:p>
+            <a:pPr marL="0" indent="0">
+              <a:buNone/>
+            </a:pPr>
+            <a:r>
+              <a:rPr lang="de-DE" sz="1800" dirty="0">
+                <a:latin typeface="Consolas" panose="020B0609020204030204" pitchFamily="49" charset="0"/>
+              </a:rPr>
+              <a:t>  </a:t>
+            </a:r>
+            <a:r>
+              <a:rPr lang="de-DE" sz="1800" dirty="0" err="1">
+                <a:latin typeface="Consolas" panose="020B0609020204030204" pitchFamily="49" charset="0"/>
+              </a:rPr>
+              <a:t>image</a:t>
+            </a:r>
+            <a:r>
+              <a:rPr lang="de-DE" sz="1800" dirty="0">
+                <a:latin typeface="Consolas" panose="020B0609020204030204" pitchFamily="49" charset="0"/>
+              </a:rPr>
+              <a:t>: docker:20.10.16</a:t>
+            </a:r>
+          </a:p>
+          <a:p>
+            <a:pPr marL="0" indent="0">
+              <a:buNone/>
+            </a:pPr>
+            <a:r>
+              <a:rPr lang="de-DE" sz="1800" dirty="0">
+                <a:latin typeface="Consolas" panose="020B0609020204030204" pitchFamily="49" charset="0"/>
+              </a:rPr>
+              <a:t>  </a:t>
+            </a:r>
+            <a:r>
+              <a:rPr lang="de-DE" sz="1800" dirty="0" err="1">
+                <a:latin typeface="Consolas" panose="020B0609020204030204" pitchFamily="49" charset="0"/>
+              </a:rPr>
+              <a:t>services</a:t>
+            </a:r>
+            <a:r>
+              <a:rPr lang="de-DE" sz="1800" dirty="0">
+                <a:latin typeface="Consolas" panose="020B0609020204030204" pitchFamily="49" charset="0"/>
+              </a:rPr>
+              <a:t>:</a:t>
+            </a:r>
+          </a:p>
+          <a:p>
+            <a:pPr marL="0" indent="0">
+              <a:buNone/>
+            </a:pPr>
+            <a:r>
+              <a:rPr lang="de-DE" sz="1800" dirty="0">
+                <a:latin typeface="Consolas" panose="020B0609020204030204" pitchFamily="49" charset="0"/>
+              </a:rPr>
+              <a:t>    - docker:20.10.16-dind</a:t>
+            </a:r>
+          </a:p>
+          <a:p>
+            <a:pPr marL="0" indent="0">
+              <a:buNone/>
+            </a:pPr>
+            <a:r>
+              <a:rPr lang="de-DE" sz="1800" dirty="0">
+                <a:latin typeface="Consolas" panose="020B0609020204030204" pitchFamily="49" charset="0"/>
+              </a:rPr>
+              <a:t>  </a:t>
+            </a:r>
+            <a:r>
+              <a:rPr lang="de-DE" sz="1800" dirty="0" err="1">
+                <a:latin typeface="Consolas" panose="020B0609020204030204" pitchFamily="49" charset="0"/>
+              </a:rPr>
+              <a:t>before_script</a:t>
+            </a:r>
+            <a:r>
+              <a:rPr lang="de-DE" sz="1800" dirty="0">
+                <a:latin typeface="Consolas" panose="020B0609020204030204" pitchFamily="49" charset="0"/>
+              </a:rPr>
+              <a:t>:</a:t>
+            </a:r>
+          </a:p>
+          <a:p>
+            <a:pPr marL="0" indent="0">
+              <a:buNone/>
+            </a:pPr>
+            <a:r>
+              <a:rPr lang="de-DE" sz="1800" dirty="0">
+                <a:latin typeface="Consolas" panose="020B0609020204030204" pitchFamily="49" charset="0"/>
+              </a:rPr>
+              <a:t>    - </a:t>
+            </a:r>
+            <a:r>
+              <a:rPr lang="de-DE" sz="1800" dirty="0" err="1">
+                <a:latin typeface="Consolas" panose="020B0609020204030204" pitchFamily="49" charset="0"/>
+              </a:rPr>
+              <a:t>docker</a:t>
+            </a:r>
+            <a:r>
+              <a:rPr lang="de-DE" sz="1800" dirty="0">
+                <a:latin typeface="Consolas" panose="020B0609020204030204" pitchFamily="49" charset="0"/>
+              </a:rPr>
+              <a:t> </a:t>
+            </a:r>
+            <a:r>
+              <a:rPr lang="de-DE" sz="1800" dirty="0" err="1">
+                <a:latin typeface="Consolas" panose="020B0609020204030204" pitchFamily="49" charset="0"/>
+              </a:rPr>
+              <a:t>login</a:t>
+            </a:r>
+            <a:r>
+              <a:rPr lang="de-DE" sz="1800" dirty="0">
+                <a:latin typeface="Consolas" panose="020B0609020204030204" pitchFamily="49" charset="0"/>
+              </a:rPr>
+              <a:t> -u $CI_REGISTRY_USER -p $CI_REGISTRY_PASSWORD $CI_REGISTRY</a:t>
+            </a:r>
+          </a:p>
+          <a:p>
+            <a:pPr marL="0" indent="0">
+              <a:buNone/>
+            </a:pPr>
+            <a:endParaRPr lang="de-DE" sz="1800" dirty="0">
+              <a:latin typeface="Consolas" panose="020B0609020204030204" pitchFamily="49" charset="0"/>
+            </a:endParaRPr>
+          </a:p>
+          <a:p>
+            <a:pPr marL="0" indent="0">
+              <a:buNone/>
+            </a:pPr>
+            <a:r>
+              <a:rPr lang="de-DE" sz="1800" dirty="0" err="1">
+                <a:latin typeface="Consolas" panose="020B0609020204030204" pitchFamily="49" charset="0"/>
+              </a:rPr>
+              <a:t>stages</a:t>
+            </a:r>
+            <a:r>
+              <a:rPr lang="de-DE" sz="1800" dirty="0">
+                <a:latin typeface="Consolas" panose="020B0609020204030204" pitchFamily="49" charset="0"/>
+              </a:rPr>
+              <a:t>: </a:t>
+            </a:r>
+            <a:r>
+              <a:rPr lang="de-DE" sz="1600" dirty="0">
+                <a:solidFill>
+                  <a:srgbClr val="008C5A"/>
+                </a:solidFill>
+                <a:latin typeface="Consolas" panose="020B0609020204030204" pitchFamily="49" charset="0"/>
+              </a:rPr>
+              <a:t># Vier Stages</a:t>
+            </a:r>
+          </a:p>
+          <a:p>
+            <a:pPr marL="0" indent="0">
+              <a:buNone/>
+            </a:pPr>
+            <a:r>
+              <a:rPr lang="de-DE" sz="1800" dirty="0">
+                <a:latin typeface="Consolas" panose="020B0609020204030204" pitchFamily="49" charset="0"/>
+              </a:rPr>
+              <a:t>  - </a:t>
+            </a:r>
+            <a:r>
+              <a:rPr lang="de-DE" sz="1800" dirty="0" err="1">
+                <a:latin typeface="Consolas" panose="020B0609020204030204" pitchFamily="49" charset="0"/>
+              </a:rPr>
+              <a:t>build</a:t>
+            </a:r>
+            <a:endParaRPr lang="de-DE" sz="1800" dirty="0">
+              <a:latin typeface="Consolas" panose="020B0609020204030204" pitchFamily="49" charset="0"/>
+            </a:endParaRPr>
+          </a:p>
+          <a:p>
+            <a:pPr marL="0" indent="0">
+              <a:buNone/>
+            </a:pPr>
+            <a:r>
+              <a:rPr lang="de-DE" sz="1800" dirty="0">
+                <a:latin typeface="Consolas" panose="020B0609020204030204" pitchFamily="49" charset="0"/>
+              </a:rPr>
+              <a:t>  - </a:t>
+            </a:r>
+            <a:r>
+              <a:rPr lang="de-DE" sz="1800" dirty="0" err="1">
+                <a:latin typeface="Consolas" panose="020B0609020204030204" pitchFamily="49" charset="0"/>
+              </a:rPr>
+              <a:t>test</a:t>
+            </a:r>
+            <a:endParaRPr lang="de-DE" sz="1800" dirty="0">
+              <a:latin typeface="Consolas" panose="020B0609020204030204" pitchFamily="49" charset="0"/>
+            </a:endParaRPr>
+          </a:p>
+          <a:p>
+            <a:pPr marL="0" indent="0">
+              <a:buNone/>
+            </a:pPr>
+            <a:r>
+              <a:rPr lang="de-DE" sz="1800" dirty="0">
+                <a:latin typeface="Consolas" panose="020B0609020204030204" pitchFamily="49" charset="0"/>
+              </a:rPr>
+              <a:t>  - release</a:t>
+            </a:r>
+          </a:p>
+          <a:p>
+            <a:pPr marL="0" indent="0">
+              <a:buNone/>
+            </a:pPr>
+            <a:r>
+              <a:rPr lang="de-DE" sz="1800" dirty="0">
+                <a:latin typeface="Consolas" panose="020B0609020204030204" pitchFamily="49" charset="0"/>
+              </a:rPr>
+              <a:t>  - deploy</a:t>
+            </a:r>
+          </a:p>
+          <a:p>
+            <a:pPr marL="0" indent="0">
+              <a:buNone/>
+            </a:pPr>
+            <a:endParaRPr lang="de-DE" sz="1600" dirty="0">
+              <a:latin typeface="Consolas" panose="020B0609020204030204" pitchFamily="49" charset="0"/>
+            </a:endParaRPr>
+          </a:p>
+          <a:p>
+            <a:pPr marL="0" indent="0">
+              <a:buNone/>
+            </a:pPr>
+            <a:endParaRPr lang="de-DE" sz="1600" dirty="0">
+              <a:latin typeface="Consolas" panose="020B0609020204030204" pitchFamily="49" charset="0"/>
+            </a:endParaRPr>
+          </a:p>
+        </p:txBody>
+      </p:sp>
+    </p:spTree>
+    <p:extLst>
+      <p:ext uri="{BB962C8B-B14F-4D97-AF65-F5344CB8AC3E}">
+        <p14:creationId xmlns:p14="http://schemas.microsoft.com/office/powerpoint/2010/main" val="3047470218"/>
+      </p:ext>
+    </p:extLst>
+  </p:cSld>
+  <p:clrMapOvr>
+    <a:masterClrMapping/>
+  </p:clrMapOvr>
+</p:sld>
+</file>
+
+<file path=ppt/slides/slide8.xml><?xml version="1.0" encoding="utf-8"?>
+<p:sld xmlns:a="http://schemas.openxmlformats.org/drawingml/2006/main" xmlns:r="http://schemas.openxmlformats.org/officeDocument/2006/relationships" xmlns:p="http://schemas.openxmlformats.org/presentationml/2006/main">
+  <p:cSld>
+    <p:spTree>
+      <p:nvGrpSpPr>
+        <p:cNvPr id="1" name=""/>
+        <p:cNvGrpSpPr/>
+        <p:nvPr/>
+      </p:nvGrpSpPr>
+      <p:grpSpPr>
+        <a:xfrm>
+          <a:off x="0" y="0"/>
+          <a:ext cx="0" cy="0"/>
+          <a:chOff x="0" y="0"/>
+          <a:chExt cx="0" cy="0"/>
+        </a:xfrm>
+      </p:grpSpPr>
+      <p:sp>
+        <p:nvSpPr>
+          <p:cNvPr id="2" name="Titel 1">
+            <a:extLst>
+              <a:ext uri="{FF2B5EF4-FFF2-40B4-BE49-F238E27FC236}">
+                <a16:creationId xmlns:a16="http://schemas.microsoft.com/office/drawing/2014/main" id="{49A48EBC-55D9-6D64-715F-AF6DEBF117C3}"/>
+              </a:ext>
+            </a:extLst>
+          </p:cNvPr>
+          <p:cNvSpPr>
+            <a:spLocks noGrp="1"/>
+          </p:cNvSpPr>
+          <p:nvPr>
+            <p:ph type="title"/>
+          </p:nvPr>
+        </p:nvSpPr>
+        <p:spPr/>
+        <p:txBody>
+          <a:bodyPr/>
+          <a:lstStyle/>
+          <a:p>
+            <a:r>
+              <a:rPr lang="de-DE" cap="none" dirty="0"/>
+              <a:t>Release- und </a:t>
+            </a:r>
+            <a:r>
+              <a:rPr lang="de-DE" cap="none" dirty="0" err="1"/>
+              <a:t>Tagged</a:t>
+            </a:r>
+            <a:r>
+              <a:rPr lang="de-DE" cap="none" dirty="0"/>
+              <a:t>-Images</a:t>
+            </a:r>
+            <a:endParaRPr lang="de-DE" dirty="0"/>
+          </a:p>
+        </p:txBody>
+      </p:sp>
+      <p:sp>
+        <p:nvSpPr>
+          <p:cNvPr id="3" name="Inhaltsplatzhalter 2">
+            <a:extLst>
+              <a:ext uri="{FF2B5EF4-FFF2-40B4-BE49-F238E27FC236}">
+                <a16:creationId xmlns:a16="http://schemas.microsoft.com/office/drawing/2014/main" id="{7B404127-ED2B-6905-BDD1-3C60D11A2A7C}"/>
+              </a:ext>
+            </a:extLst>
+          </p:cNvPr>
+          <p:cNvSpPr>
+            <a:spLocks noGrp="1"/>
+          </p:cNvSpPr>
+          <p:nvPr>
+            <p:ph idx="1"/>
+          </p:nvPr>
+        </p:nvSpPr>
+        <p:spPr/>
+        <p:txBody>
+          <a:bodyPr/>
+          <a:lstStyle/>
+          <a:p>
+            <a:pPr marL="0" indent="0">
+              <a:buNone/>
+            </a:pPr>
+            <a:r>
+              <a:rPr lang="de-DE" sz="2000" b="1" dirty="0">
+                <a:latin typeface="Consolas" panose="020B0609020204030204" pitchFamily="49" charset="0"/>
+              </a:rPr>
+              <a:t>.</a:t>
+            </a:r>
+            <a:r>
+              <a:rPr lang="de-DE" sz="2000" b="1" dirty="0" err="1">
+                <a:latin typeface="Consolas" panose="020B0609020204030204" pitchFamily="49" charset="0"/>
+              </a:rPr>
+              <a:t>gitlab-ci.yml</a:t>
+            </a:r>
+            <a:r>
+              <a:rPr lang="de-DE" sz="2000" b="1" dirty="0">
+                <a:latin typeface="Consolas" panose="020B0609020204030204" pitchFamily="49" charset="0"/>
+              </a:rPr>
+              <a:t> (2/4)</a:t>
+            </a:r>
+          </a:p>
+          <a:p>
+            <a:pPr marL="0" indent="0">
+              <a:buNone/>
+            </a:pPr>
+            <a:r>
+              <a:rPr lang="de-DE" sz="1600" dirty="0">
+                <a:latin typeface="Consolas" panose="020B0609020204030204" pitchFamily="49" charset="0"/>
+              </a:rPr>
+              <a:t>variables:</a:t>
+            </a:r>
+          </a:p>
+          <a:p>
+            <a:pPr marL="0" indent="0">
+              <a:buNone/>
+            </a:pPr>
+            <a:r>
+              <a:rPr lang="de-DE" sz="1600" dirty="0">
+                <a:latin typeface="Consolas" panose="020B0609020204030204" pitchFamily="49" charset="0"/>
+              </a:rPr>
+              <a:t>  # Use TLS </a:t>
+            </a:r>
+            <a:r>
+              <a:rPr lang="de-DE" sz="1600" b="1" dirty="0">
+                <a:latin typeface="Consolas" panose="020B0609020204030204" pitchFamily="49" charset="0"/>
+              </a:rPr>
+              <a:t>(kein Muss!)</a:t>
+            </a:r>
+            <a:r>
+              <a:rPr lang="de-DE" sz="1600" dirty="0">
+                <a:latin typeface="Consolas" panose="020B0609020204030204" pitchFamily="49" charset="0"/>
+              </a:rPr>
+              <a:t> https://docs.gitlab.com/ee/ci/docker/using_docker_build.html#tls-enabled</a:t>
+            </a:r>
+          </a:p>
+          <a:p>
+            <a:pPr marL="0" indent="0">
+              <a:buNone/>
+            </a:pPr>
+            <a:r>
+              <a:rPr lang="de-DE" sz="1600" dirty="0">
+                <a:latin typeface="Consolas" panose="020B0609020204030204" pitchFamily="49" charset="0"/>
+              </a:rPr>
+              <a:t>  DOCKER_HOST: tcp://docker:2376</a:t>
+            </a:r>
+          </a:p>
+          <a:p>
+            <a:pPr marL="0" indent="0">
+              <a:buNone/>
+            </a:pPr>
+            <a:r>
+              <a:rPr lang="de-DE" sz="1600" dirty="0">
+                <a:latin typeface="Consolas" panose="020B0609020204030204" pitchFamily="49" charset="0"/>
+              </a:rPr>
+              <a:t>  DOCKER_TLS_CERTDIR: "/</a:t>
+            </a:r>
+            <a:r>
+              <a:rPr lang="de-DE" sz="1600" dirty="0" err="1">
+                <a:latin typeface="Consolas" panose="020B0609020204030204" pitchFamily="49" charset="0"/>
+              </a:rPr>
+              <a:t>certs</a:t>
+            </a:r>
+            <a:r>
+              <a:rPr lang="de-DE" sz="1600" dirty="0">
+                <a:latin typeface="Consolas" panose="020B0609020204030204" pitchFamily="49" charset="0"/>
+              </a:rPr>
+              <a:t>"</a:t>
+            </a:r>
+          </a:p>
+          <a:p>
+            <a:pPr marL="0" indent="0">
+              <a:buNone/>
+            </a:pPr>
+            <a:r>
+              <a:rPr lang="de-DE" sz="1600" dirty="0">
+                <a:latin typeface="Consolas" panose="020B0609020204030204" pitchFamily="49" charset="0"/>
+              </a:rPr>
+              <a:t>  CONTAINER_TEST_IMAGE: $CI_REGISTRY_IMAGE:$CI_COMMIT_REF_SLUG</a:t>
+            </a:r>
+          </a:p>
+          <a:p>
+            <a:pPr marL="0" indent="0">
+              <a:buNone/>
+            </a:pPr>
+            <a:r>
+              <a:rPr lang="de-DE" sz="1600" dirty="0">
+                <a:latin typeface="Consolas" panose="020B0609020204030204" pitchFamily="49" charset="0"/>
+              </a:rPr>
+              <a:t>  CONTAINER_RELEASE_IMAGE: $</a:t>
+            </a:r>
+            <a:r>
+              <a:rPr lang="de-DE" sz="1600" dirty="0" err="1">
+                <a:latin typeface="Consolas" panose="020B0609020204030204" pitchFamily="49" charset="0"/>
+              </a:rPr>
+              <a:t>CI_REGISTRY_IMAGE:latest</a:t>
+            </a:r>
+            <a:r>
+              <a:rPr lang="de-DE" sz="1600" dirty="0">
+                <a:latin typeface="Consolas" panose="020B0609020204030204" pitchFamily="49" charset="0"/>
+              </a:rPr>
+              <a:t> </a:t>
+            </a:r>
+            <a:r>
+              <a:rPr lang="de-DE" sz="1600" dirty="0">
+                <a:solidFill>
+                  <a:srgbClr val="008C5A"/>
+                </a:solidFill>
+                <a:latin typeface="Consolas" panose="020B0609020204030204" pitchFamily="49" charset="0"/>
+              </a:rPr>
+              <a:t># Variable für 4.</a:t>
+            </a:r>
+          </a:p>
+          <a:p>
+            <a:pPr marL="0" indent="0">
+              <a:buNone/>
+            </a:pPr>
+            <a:endParaRPr lang="de-DE" sz="1600" dirty="0">
+              <a:latin typeface="Consolas" panose="020B0609020204030204" pitchFamily="49" charset="0"/>
+            </a:endParaRPr>
+          </a:p>
+          <a:p>
+            <a:pPr marL="0" indent="0">
+              <a:buNone/>
+            </a:pPr>
+            <a:r>
+              <a:rPr lang="de-DE" sz="1600" dirty="0" err="1">
+                <a:latin typeface="Consolas" panose="020B0609020204030204" pitchFamily="49" charset="0"/>
+              </a:rPr>
+              <a:t>build</a:t>
+            </a:r>
+            <a:r>
+              <a:rPr lang="de-DE" sz="1600" dirty="0">
+                <a:latin typeface="Consolas" panose="020B0609020204030204" pitchFamily="49" charset="0"/>
+              </a:rPr>
+              <a:t>:</a:t>
+            </a:r>
+          </a:p>
+          <a:p>
+            <a:pPr marL="0" indent="0">
+              <a:buNone/>
+            </a:pPr>
+            <a:r>
+              <a:rPr lang="de-DE" sz="1600" dirty="0">
+                <a:latin typeface="Consolas" panose="020B0609020204030204" pitchFamily="49" charset="0"/>
+              </a:rPr>
+              <a:t>  </a:t>
+            </a:r>
+            <a:r>
+              <a:rPr lang="de-DE" sz="1600" dirty="0" err="1">
+                <a:latin typeface="Consolas" panose="020B0609020204030204" pitchFamily="49" charset="0"/>
+              </a:rPr>
+              <a:t>stage</a:t>
+            </a:r>
+            <a:r>
+              <a:rPr lang="de-DE" sz="1600" dirty="0">
+                <a:latin typeface="Consolas" panose="020B0609020204030204" pitchFamily="49" charset="0"/>
+              </a:rPr>
+              <a:t>: </a:t>
+            </a:r>
+            <a:r>
+              <a:rPr lang="de-DE" sz="1600" dirty="0" err="1">
+                <a:latin typeface="Consolas" panose="020B0609020204030204" pitchFamily="49" charset="0"/>
+              </a:rPr>
+              <a:t>build</a:t>
+            </a:r>
+            <a:endParaRPr lang="de-DE" sz="1600" dirty="0">
+              <a:latin typeface="Consolas" panose="020B0609020204030204" pitchFamily="49" charset="0"/>
+            </a:endParaRPr>
+          </a:p>
+          <a:p>
+            <a:pPr marL="0" indent="0">
+              <a:buNone/>
+            </a:pPr>
+            <a:r>
+              <a:rPr lang="de-DE" sz="1600" dirty="0">
+                <a:latin typeface="Consolas" panose="020B0609020204030204" pitchFamily="49" charset="0"/>
+              </a:rPr>
+              <a:t>  </a:t>
+            </a:r>
+            <a:r>
+              <a:rPr lang="de-DE" sz="1600" dirty="0" err="1">
+                <a:latin typeface="Consolas" panose="020B0609020204030204" pitchFamily="49" charset="0"/>
+              </a:rPr>
+              <a:t>script</a:t>
+            </a:r>
+            <a:r>
+              <a:rPr lang="de-DE" sz="1600" dirty="0">
+                <a:latin typeface="Consolas" panose="020B0609020204030204" pitchFamily="49" charset="0"/>
+              </a:rPr>
+              <a:t>:</a:t>
+            </a:r>
+          </a:p>
+          <a:p>
+            <a:pPr marL="0" indent="0">
+              <a:buNone/>
+            </a:pPr>
+            <a:r>
+              <a:rPr lang="de-DE" sz="1600" dirty="0">
+                <a:latin typeface="Consolas" panose="020B0609020204030204" pitchFamily="49" charset="0"/>
+              </a:rPr>
+              <a:t>    - </a:t>
+            </a:r>
+            <a:r>
+              <a:rPr lang="de-DE" sz="1600" dirty="0" err="1">
+                <a:latin typeface="Consolas" panose="020B0609020204030204" pitchFamily="49" charset="0"/>
+              </a:rPr>
+              <a:t>docker</a:t>
+            </a:r>
+            <a:r>
+              <a:rPr lang="de-DE" sz="1600" dirty="0">
+                <a:latin typeface="Consolas" panose="020B0609020204030204" pitchFamily="49" charset="0"/>
+              </a:rPr>
+              <a:t> </a:t>
+            </a:r>
+            <a:r>
+              <a:rPr lang="de-DE" sz="1600" dirty="0" err="1">
+                <a:latin typeface="Consolas" panose="020B0609020204030204" pitchFamily="49" charset="0"/>
+              </a:rPr>
+              <a:t>build</a:t>
+            </a:r>
+            <a:r>
+              <a:rPr lang="de-DE" sz="1600" dirty="0">
+                <a:latin typeface="Consolas" panose="020B0609020204030204" pitchFamily="49" charset="0"/>
+              </a:rPr>
+              <a:t> --pull -t $CONTAINER_TEST_IMAGE .</a:t>
+            </a:r>
+          </a:p>
+          <a:p>
+            <a:pPr marL="0" indent="0">
+              <a:buNone/>
+            </a:pPr>
+            <a:r>
+              <a:rPr lang="de-DE" sz="1600" dirty="0">
+                <a:latin typeface="Consolas" panose="020B0609020204030204" pitchFamily="49" charset="0"/>
+              </a:rPr>
+              <a:t>    - </a:t>
+            </a:r>
+            <a:r>
+              <a:rPr lang="de-DE" sz="1600" dirty="0" err="1">
+                <a:latin typeface="Consolas" panose="020B0609020204030204" pitchFamily="49" charset="0"/>
+              </a:rPr>
+              <a:t>docker</a:t>
+            </a:r>
+            <a:r>
+              <a:rPr lang="de-DE" sz="1600" dirty="0">
+                <a:latin typeface="Consolas" panose="020B0609020204030204" pitchFamily="49" charset="0"/>
+              </a:rPr>
+              <a:t> push $CONTAINER_TEST_IMAGE </a:t>
+            </a:r>
+            <a:r>
+              <a:rPr lang="de-DE" sz="1600" dirty="0">
+                <a:solidFill>
+                  <a:srgbClr val="008C5A"/>
+                </a:solidFill>
+                <a:latin typeface="Consolas" panose="020B0609020204030204" pitchFamily="49" charset="0"/>
+              </a:rPr>
+              <a:t># 1. </a:t>
+            </a:r>
+            <a:r>
+              <a:rPr lang="de-DE" sz="1600" dirty="0" err="1">
+                <a:solidFill>
+                  <a:srgbClr val="008C5A"/>
+                </a:solidFill>
+                <a:latin typeface="Consolas" panose="020B0609020204030204" pitchFamily="49" charset="0"/>
+              </a:rPr>
+              <a:t>Build</a:t>
+            </a:r>
+            <a:r>
+              <a:rPr lang="de-DE" sz="1600" dirty="0">
+                <a:solidFill>
+                  <a:srgbClr val="008C5A"/>
+                </a:solidFill>
+                <a:latin typeface="Consolas" panose="020B0609020204030204" pitchFamily="49" charset="0"/>
+              </a:rPr>
+              <a:t> wird in die Container Registry </a:t>
+            </a:r>
+            <a:r>
+              <a:rPr lang="de-DE" sz="1600" dirty="0" err="1">
+                <a:solidFill>
+                  <a:srgbClr val="008C5A"/>
+                </a:solidFill>
+                <a:latin typeface="Consolas" panose="020B0609020204030204" pitchFamily="49" charset="0"/>
+              </a:rPr>
+              <a:t>gepushed</a:t>
+            </a:r>
+            <a:endParaRPr lang="de-DE" sz="1600" dirty="0">
+              <a:solidFill>
+                <a:srgbClr val="008C5A"/>
+              </a:solidFill>
+              <a:latin typeface="Consolas" panose="020B0609020204030204" pitchFamily="49" charset="0"/>
+            </a:endParaRPr>
+          </a:p>
+          <a:p>
+            <a:pPr marL="0" indent="0">
+              <a:buNone/>
+            </a:pPr>
+            <a:endParaRPr lang="de-DE" sz="1600" dirty="0">
+              <a:latin typeface="Consolas" panose="020B0609020204030204" pitchFamily="49" charset="0"/>
+            </a:endParaRPr>
+          </a:p>
+          <a:p>
+            <a:pPr marL="0" indent="0">
+              <a:buNone/>
+            </a:pPr>
+            <a:endParaRPr lang="de-DE" sz="1600" dirty="0">
+              <a:latin typeface="Consolas" panose="020B0609020204030204" pitchFamily="49" charset="0"/>
+            </a:endParaRPr>
+          </a:p>
+          <a:p>
+            <a:pPr marL="0" indent="0">
+              <a:buNone/>
+            </a:pPr>
+            <a:endParaRPr lang="de-DE" sz="1600" dirty="0">
+              <a:latin typeface="Consolas" panose="020B0609020204030204" pitchFamily="49" charset="0"/>
+            </a:endParaRPr>
+          </a:p>
+        </p:txBody>
+      </p:sp>
+    </p:spTree>
+    <p:extLst>
+      <p:ext uri="{BB962C8B-B14F-4D97-AF65-F5344CB8AC3E}">
+        <p14:creationId xmlns:p14="http://schemas.microsoft.com/office/powerpoint/2010/main" val="812820427"/>
+      </p:ext>
+    </p:extLst>
+  </p:cSld>
+  <p:clrMapOvr>
+    <a:masterClrMapping/>
+  </p:clrMapOvr>
+</p:sld>
+</file>
+
+<file path=ppt/slides/slide9.xml><?xml version="1.0" encoding="utf-8"?>
+<p:sld xmlns:a="http://schemas.openxmlformats.org/drawingml/2006/main" xmlns:r="http://schemas.openxmlformats.org/officeDocument/2006/relationships" xmlns:p="http://schemas.openxmlformats.org/presentationml/2006/main">
+  <p:cSld>
+    <p:spTree>
+      <p:nvGrpSpPr>
+        <p:cNvPr id="1" name=""/>
+        <p:cNvGrpSpPr/>
+        <p:nvPr/>
+      </p:nvGrpSpPr>
+      <p:grpSpPr>
+        <a:xfrm>
+          <a:off x="0" y="0"/>
+          <a:ext cx="0" cy="0"/>
+          <a:chOff x="0" y="0"/>
+          <a:chExt cx="0" cy="0"/>
+        </a:xfrm>
+      </p:grpSpPr>
+      <p:sp>
+        <p:nvSpPr>
+          <p:cNvPr id="2" name="Titel 1">
+            <a:extLst>
+              <a:ext uri="{FF2B5EF4-FFF2-40B4-BE49-F238E27FC236}">
+                <a16:creationId xmlns:a16="http://schemas.microsoft.com/office/drawing/2014/main" id="{49A48EBC-55D9-6D64-715F-AF6DEBF117C3}"/>
+              </a:ext>
+            </a:extLst>
+          </p:cNvPr>
+          <p:cNvSpPr>
+            <a:spLocks noGrp="1"/>
+          </p:cNvSpPr>
+          <p:nvPr>
+            <p:ph type="title"/>
+          </p:nvPr>
+        </p:nvSpPr>
+        <p:spPr/>
+        <p:txBody>
+          <a:bodyPr/>
+          <a:lstStyle/>
+          <a:p>
+            <a:r>
+              <a:rPr lang="de-DE" cap="none" dirty="0"/>
+              <a:t>Release- und </a:t>
+            </a:r>
+            <a:r>
+              <a:rPr lang="de-DE" cap="none" dirty="0" err="1"/>
+              <a:t>Tagged</a:t>
+            </a:r>
+            <a:r>
+              <a:rPr lang="de-DE" cap="none" dirty="0"/>
+              <a:t>-Images</a:t>
+            </a:r>
+            <a:endParaRPr lang="de-DE" dirty="0"/>
+          </a:p>
+        </p:txBody>
+      </p:sp>
+      <p:sp>
+        <p:nvSpPr>
+          <p:cNvPr id="3" name="Inhaltsplatzhalter 2">
+            <a:extLst>
+              <a:ext uri="{FF2B5EF4-FFF2-40B4-BE49-F238E27FC236}">
+                <a16:creationId xmlns:a16="http://schemas.microsoft.com/office/drawing/2014/main" id="{7B404127-ED2B-6905-BDD1-3C60D11A2A7C}"/>
+              </a:ext>
+            </a:extLst>
+          </p:cNvPr>
+          <p:cNvSpPr>
+            <a:spLocks noGrp="1"/>
+          </p:cNvSpPr>
+          <p:nvPr>
+            <p:ph idx="1"/>
+          </p:nvPr>
+        </p:nvSpPr>
+        <p:spPr/>
+        <p:txBody>
+          <a:bodyPr/>
+          <a:lstStyle/>
+          <a:p>
+            <a:pPr marL="0" indent="0">
+              <a:buNone/>
+            </a:pPr>
+            <a:r>
+              <a:rPr lang="de-DE" sz="2000" b="1" dirty="0">
+                <a:latin typeface="Consolas" panose="020B0609020204030204" pitchFamily="49" charset="0"/>
+              </a:rPr>
+              <a:t>.</a:t>
+            </a:r>
+            <a:r>
+              <a:rPr lang="de-DE" sz="2000" b="1" dirty="0" err="1">
+                <a:latin typeface="Consolas" panose="020B0609020204030204" pitchFamily="49" charset="0"/>
+              </a:rPr>
+              <a:t>gitlab-ci.yml</a:t>
+            </a:r>
+            <a:r>
+              <a:rPr lang="de-DE" sz="2000" b="1" dirty="0">
+                <a:latin typeface="Consolas" panose="020B0609020204030204" pitchFamily="49" charset="0"/>
+              </a:rPr>
+              <a:t> (3/4)</a:t>
+            </a:r>
+          </a:p>
+          <a:p>
+            <a:pPr marL="0" indent="0">
+              <a:buNone/>
+            </a:pPr>
+            <a:r>
+              <a:rPr lang="de-DE" sz="1600" dirty="0">
+                <a:latin typeface="Consolas" panose="020B0609020204030204" pitchFamily="49" charset="0"/>
+              </a:rPr>
+              <a:t>test1:</a:t>
+            </a:r>
+          </a:p>
+          <a:p>
+            <a:pPr marL="0" indent="0">
+              <a:buNone/>
+            </a:pPr>
+            <a:r>
+              <a:rPr lang="de-DE" sz="1600" dirty="0">
+                <a:latin typeface="Consolas" panose="020B0609020204030204" pitchFamily="49" charset="0"/>
+              </a:rPr>
+              <a:t>  </a:t>
+            </a:r>
+            <a:r>
+              <a:rPr lang="de-DE" sz="1600" dirty="0" err="1">
+                <a:latin typeface="Consolas" panose="020B0609020204030204" pitchFamily="49" charset="0"/>
+              </a:rPr>
+              <a:t>stage</a:t>
+            </a:r>
+            <a:r>
+              <a:rPr lang="de-DE" sz="1600" dirty="0">
+                <a:latin typeface="Consolas" panose="020B0609020204030204" pitchFamily="49" charset="0"/>
+              </a:rPr>
+              <a:t>: </a:t>
+            </a:r>
+            <a:r>
+              <a:rPr lang="de-DE" sz="1600" dirty="0" err="1">
+                <a:latin typeface="Consolas" panose="020B0609020204030204" pitchFamily="49" charset="0"/>
+              </a:rPr>
+              <a:t>test</a:t>
+            </a:r>
+            <a:endParaRPr lang="de-DE" sz="1600" dirty="0">
+              <a:latin typeface="Consolas" panose="020B0609020204030204" pitchFamily="49" charset="0"/>
+            </a:endParaRPr>
+          </a:p>
+          <a:p>
+            <a:pPr marL="0" indent="0">
+              <a:buNone/>
+            </a:pPr>
+            <a:r>
+              <a:rPr lang="de-DE" sz="1600" dirty="0">
+                <a:latin typeface="Consolas" panose="020B0609020204030204" pitchFamily="49" charset="0"/>
+              </a:rPr>
+              <a:t>  </a:t>
+            </a:r>
+            <a:r>
+              <a:rPr lang="de-DE" sz="1600" dirty="0" err="1">
+                <a:latin typeface="Consolas" panose="020B0609020204030204" pitchFamily="49" charset="0"/>
+              </a:rPr>
+              <a:t>script</a:t>
+            </a:r>
+            <a:r>
+              <a:rPr lang="de-DE" sz="1600" dirty="0">
+                <a:latin typeface="Consolas" panose="020B0609020204030204" pitchFamily="49" charset="0"/>
+              </a:rPr>
+              <a:t>:</a:t>
+            </a:r>
+          </a:p>
+          <a:p>
+            <a:pPr marL="0" indent="0">
+              <a:buNone/>
+            </a:pPr>
+            <a:r>
+              <a:rPr lang="de-DE" sz="1600" dirty="0">
+                <a:latin typeface="Consolas" panose="020B0609020204030204" pitchFamily="49" charset="0"/>
+              </a:rPr>
+              <a:t>    - </a:t>
+            </a:r>
+            <a:r>
+              <a:rPr lang="de-DE" sz="1600" dirty="0" err="1">
+                <a:latin typeface="Consolas" panose="020B0609020204030204" pitchFamily="49" charset="0"/>
+              </a:rPr>
+              <a:t>docker</a:t>
+            </a:r>
+            <a:r>
+              <a:rPr lang="de-DE" sz="1600" dirty="0">
+                <a:latin typeface="Consolas" panose="020B0609020204030204" pitchFamily="49" charset="0"/>
+              </a:rPr>
+              <a:t> pull $CONTAINER_TEST_IMAGE </a:t>
+            </a:r>
+            <a:r>
+              <a:rPr lang="de-DE" sz="1600" dirty="0">
+                <a:solidFill>
+                  <a:srgbClr val="008C5A"/>
+                </a:solidFill>
+                <a:latin typeface="Consolas" panose="020B0609020204030204" pitchFamily="49" charset="0"/>
+              </a:rPr>
+              <a:t># 2. Von den nachfolgenden Stages (bei Bedarf) </a:t>
+            </a:r>
+            <a:r>
+              <a:rPr lang="de-DE" sz="1600" dirty="0" err="1">
+                <a:solidFill>
+                  <a:srgbClr val="008C5A"/>
+                </a:solidFill>
+                <a:latin typeface="Consolas" panose="020B0609020204030204" pitchFamily="49" charset="0"/>
+              </a:rPr>
+              <a:t>gepulled</a:t>
+            </a:r>
+            <a:endParaRPr lang="de-DE" sz="1600" dirty="0">
+              <a:solidFill>
+                <a:srgbClr val="008C5A"/>
+              </a:solidFill>
+              <a:latin typeface="Consolas" panose="020B0609020204030204" pitchFamily="49" charset="0"/>
+            </a:endParaRPr>
+          </a:p>
+          <a:p>
+            <a:pPr marL="0" indent="0">
+              <a:buNone/>
+            </a:pPr>
+            <a:r>
+              <a:rPr lang="de-DE" sz="1600" dirty="0">
+                <a:latin typeface="Consolas" panose="020B0609020204030204" pitchFamily="49" charset="0"/>
+              </a:rPr>
+              <a:t>    - </a:t>
+            </a:r>
+            <a:r>
+              <a:rPr lang="de-DE" sz="1600" dirty="0" err="1">
+                <a:latin typeface="Consolas" panose="020B0609020204030204" pitchFamily="49" charset="0"/>
+              </a:rPr>
+              <a:t>docker</a:t>
+            </a:r>
+            <a:r>
+              <a:rPr lang="de-DE" sz="1600" dirty="0">
+                <a:latin typeface="Consolas" panose="020B0609020204030204" pitchFamily="49" charset="0"/>
+              </a:rPr>
+              <a:t> </a:t>
+            </a:r>
+            <a:r>
+              <a:rPr lang="de-DE" sz="1600" dirty="0" err="1">
+                <a:latin typeface="Consolas" panose="020B0609020204030204" pitchFamily="49" charset="0"/>
+              </a:rPr>
+              <a:t>run</a:t>
+            </a:r>
+            <a:r>
+              <a:rPr lang="de-DE" sz="1600" dirty="0">
+                <a:latin typeface="Consolas" panose="020B0609020204030204" pitchFamily="49" charset="0"/>
+              </a:rPr>
+              <a:t> $CONTAINER_TEST_IMAGE /</a:t>
+            </a:r>
+            <a:r>
+              <a:rPr lang="de-DE" sz="1600" dirty="0" err="1">
+                <a:latin typeface="Consolas" panose="020B0609020204030204" pitchFamily="49" charset="0"/>
+              </a:rPr>
+              <a:t>script</a:t>
+            </a:r>
+            <a:r>
+              <a:rPr lang="de-DE" sz="1600" dirty="0">
+                <a:latin typeface="Consolas" panose="020B0609020204030204" pitchFamily="49" charset="0"/>
+              </a:rPr>
+              <a:t>/</a:t>
+            </a:r>
+            <a:r>
+              <a:rPr lang="de-DE" sz="1600" dirty="0" err="1">
+                <a:latin typeface="Consolas" panose="020B0609020204030204" pitchFamily="49" charset="0"/>
+              </a:rPr>
+              <a:t>to</a:t>
+            </a:r>
+            <a:r>
+              <a:rPr lang="de-DE" sz="1600" dirty="0">
+                <a:latin typeface="Consolas" panose="020B0609020204030204" pitchFamily="49" charset="0"/>
+              </a:rPr>
+              <a:t>/</a:t>
+            </a:r>
+            <a:r>
+              <a:rPr lang="de-DE" sz="1600" dirty="0" err="1">
+                <a:latin typeface="Consolas" panose="020B0609020204030204" pitchFamily="49" charset="0"/>
+              </a:rPr>
+              <a:t>run</a:t>
+            </a:r>
+            <a:r>
+              <a:rPr lang="de-DE" sz="1600" dirty="0">
+                <a:latin typeface="Consolas" panose="020B0609020204030204" pitchFamily="49" charset="0"/>
+              </a:rPr>
+              <a:t>/</a:t>
+            </a:r>
+            <a:r>
+              <a:rPr lang="de-DE" sz="1600" dirty="0" err="1">
+                <a:latin typeface="Consolas" panose="020B0609020204030204" pitchFamily="49" charset="0"/>
+              </a:rPr>
+              <a:t>tests</a:t>
+            </a:r>
+            <a:r>
+              <a:rPr lang="de-DE" sz="1600" dirty="0">
+                <a:latin typeface="Consolas" panose="020B0609020204030204" pitchFamily="49" charset="0"/>
+              </a:rPr>
+              <a:t> </a:t>
+            </a:r>
+            <a:r>
+              <a:rPr lang="de-DE" sz="1600" dirty="0">
+                <a:solidFill>
+                  <a:srgbClr val="008C5A"/>
+                </a:solidFill>
+                <a:latin typeface="Consolas" panose="020B0609020204030204" pitchFamily="49" charset="0"/>
+              </a:rPr>
+              <a:t># 3. Zwei </a:t>
+            </a:r>
+            <a:r>
+              <a:rPr lang="de-DE" sz="1600" dirty="0" err="1">
+                <a:solidFill>
+                  <a:srgbClr val="008C5A"/>
+                </a:solidFill>
+                <a:latin typeface="Consolas" panose="020B0609020204030204" pitchFamily="49" charset="0"/>
+              </a:rPr>
+              <a:t>paralell</a:t>
+            </a:r>
+            <a:r>
+              <a:rPr lang="de-DE" sz="1600" dirty="0">
+                <a:solidFill>
+                  <a:srgbClr val="008C5A"/>
+                </a:solidFill>
+                <a:latin typeface="Consolas" panose="020B0609020204030204" pitchFamily="49" charset="0"/>
+              </a:rPr>
+              <a:t> laufende Tests</a:t>
+            </a:r>
+          </a:p>
+          <a:p>
+            <a:pPr marL="0" indent="0">
+              <a:buNone/>
+            </a:pPr>
+            <a:endParaRPr lang="de-DE" sz="1600" dirty="0">
+              <a:latin typeface="Consolas" panose="020B0609020204030204" pitchFamily="49" charset="0"/>
+            </a:endParaRPr>
+          </a:p>
+          <a:p>
+            <a:pPr marL="0" indent="0">
+              <a:buNone/>
+            </a:pPr>
+            <a:r>
+              <a:rPr lang="de-DE" sz="1600" dirty="0">
+                <a:latin typeface="Consolas" panose="020B0609020204030204" pitchFamily="49" charset="0"/>
+              </a:rPr>
+              <a:t>test2:</a:t>
+            </a:r>
+          </a:p>
+          <a:p>
+            <a:pPr marL="0" indent="0">
+              <a:buNone/>
+            </a:pPr>
+            <a:r>
+              <a:rPr lang="de-DE" sz="1600" dirty="0">
+                <a:latin typeface="Consolas" panose="020B0609020204030204" pitchFamily="49" charset="0"/>
+              </a:rPr>
+              <a:t>  </a:t>
+            </a:r>
+            <a:r>
+              <a:rPr lang="de-DE" sz="1600" dirty="0" err="1">
+                <a:latin typeface="Consolas" panose="020B0609020204030204" pitchFamily="49" charset="0"/>
+              </a:rPr>
+              <a:t>stage</a:t>
+            </a:r>
+            <a:r>
+              <a:rPr lang="de-DE" sz="1600" dirty="0">
+                <a:latin typeface="Consolas" panose="020B0609020204030204" pitchFamily="49" charset="0"/>
+              </a:rPr>
+              <a:t>: </a:t>
+            </a:r>
+            <a:r>
+              <a:rPr lang="de-DE" sz="1600" dirty="0" err="1">
+                <a:latin typeface="Consolas" panose="020B0609020204030204" pitchFamily="49" charset="0"/>
+              </a:rPr>
+              <a:t>test</a:t>
+            </a:r>
+            <a:endParaRPr lang="de-DE" sz="1600" dirty="0">
+              <a:latin typeface="Consolas" panose="020B0609020204030204" pitchFamily="49" charset="0"/>
+            </a:endParaRPr>
+          </a:p>
+          <a:p>
+            <a:pPr marL="0" indent="0">
+              <a:buNone/>
+            </a:pPr>
+            <a:r>
+              <a:rPr lang="de-DE" sz="1600" dirty="0">
+                <a:latin typeface="Consolas" panose="020B0609020204030204" pitchFamily="49" charset="0"/>
+              </a:rPr>
+              <a:t>  </a:t>
+            </a:r>
+            <a:r>
+              <a:rPr lang="de-DE" sz="1600" dirty="0" err="1">
+                <a:latin typeface="Consolas" panose="020B0609020204030204" pitchFamily="49" charset="0"/>
+              </a:rPr>
+              <a:t>script</a:t>
+            </a:r>
+            <a:r>
+              <a:rPr lang="de-DE" sz="1600" dirty="0">
+                <a:latin typeface="Consolas" panose="020B0609020204030204" pitchFamily="49" charset="0"/>
+              </a:rPr>
+              <a:t>:</a:t>
+            </a:r>
+          </a:p>
+          <a:p>
+            <a:pPr marL="0" indent="0">
+              <a:buNone/>
+            </a:pPr>
+            <a:r>
+              <a:rPr lang="de-DE" sz="1600" dirty="0">
+                <a:latin typeface="Consolas" panose="020B0609020204030204" pitchFamily="49" charset="0"/>
+              </a:rPr>
+              <a:t>    - </a:t>
+            </a:r>
+            <a:r>
+              <a:rPr lang="de-DE" sz="1600" dirty="0" err="1">
+                <a:latin typeface="Consolas" panose="020B0609020204030204" pitchFamily="49" charset="0"/>
+              </a:rPr>
+              <a:t>docker</a:t>
+            </a:r>
+            <a:r>
+              <a:rPr lang="de-DE" sz="1600" dirty="0">
+                <a:latin typeface="Consolas" panose="020B0609020204030204" pitchFamily="49" charset="0"/>
+              </a:rPr>
+              <a:t> pull $CONTAINER_TEST_IMAGE </a:t>
+            </a:r>
+            <a:r>
+              <a:rPr lang="de-DE" sz="1600" dirty="0">
+                <a:solidFill>
+                  <a:srgbClr val="008C5A"/>
+                </a:solidFill>
+                <a:latin typeface="Consolas" panose="020B0609020204030204" pitchFamily="49" charset="0"/>
+              </a:rPr>
+              <a:t># 2. Von den nachfolgenden Stages (bei Bedarf) </a:t>
+            </a:r>
+            <a:r>
+              <a:rPr lang="de-DE" sz="1600" dirty="0" err="1">
+                <a:solidFill>
+                  <a:srgbClr val="008C5A"/>
+                </a:solidFill>
+                <a:latin typeface="Consolas" panose="020B0609020204030204" pitchFamily="49" charset="0"/>
+              </a:rPr>
+              <a:t>gepulled</a:t>
+            </a:r>
+            <a:endParaRPr lang="de-DE" sz="1600" dirty="0">
+              <a:solidFill>
+                <a:srgbClr val="008C5A"/>
+              </a:solidFill>
+              <a:latin typeface="Consolas" panose="020B0609020204030204" pitchFamily="49" charset="0"/>
+            </a:endParaRPr>
+          </a:p>
+          <a:p>
+            <a:pPr marL="0" indent="0">
+              <a:buNone/>
+            </a:pPr>
+            <a:r>
+              <a:rPr lang="de-DE" sz="1600" dirty="0">
+                <a:latin typeface="Consolas" panose="020B0609020204030204" pitchFamily="49" charset="0"/>
+              </a:rPr>
+              <a:t>    - </a:t>
+            </a:r>
+            <a:r>
+              <a:rPr lang="de-DE" sz="1600" dirty="0" err="1">
+                <a:latin typeface="Consolas" panose="020B0609020204030204" pitchFamily="49" charset="0"/>
+              </a:rPr>
+              <a:t>docker</a:t>
+            </a:r>
+            <a:r>
+              <a:rPr lang="de-DE" sz="1600" dirty="0">
+                <a:latin typeface="Consolas" panose="020B0609020204030204" pitchFamily="49" charset="0"/>
+              </a:rPr>
+              <a:t> </a:t>
+            </a:r>
+            <a:r>
+              <a:rPr lang="de-DE" sz="1600" dirty="0" err="1">
+                <a:latin typeface="Consolas" panose="020B0609020204030204" pitchFamily="49" charset="0"/>
+              </a:rPr>
+              <a:t>run</a:t>
+            </a:r>
+            <a:r>
+              <a:rPr lang="de-DE" sz="1600" dirty="0">
+                <a:latin typeface="Consolas" panose="020B0609020204030204" pitchFamily="49" charset="0"/>
+              </a:rPr>
+              <a:t> $CONTAINER_TEST_IMAGE /</a:t>
+            </a:r>
+            <a:r>
+              <a:rPr lang="de-DE" sz="1600" dirty="0" err="1">
+                <a:latin typeface="Consolas" panose="020B0609020204030204" pitchFamily="49" charset="0"/>
+              </a:rPr>
+              <a:t>script</a:t>
+            </a:r>
+            <a:r>
+              <a:rPr lang="de-DE" sz="1600" dirty="0">
+                <a:latin typeface="Consolas" panose="020B0609020204030204" pitchFamily="49" charset="0"/>
+              </a:rPr>
+              <a:t>/</a:t>
+            </a:r>
+            <a:r>
+              <a:rPr lang="de-DE" sz="1600" dirty="0" err="1">
+                <a:latin typeface="Consolas" panose="020B0609020204030204" pitchFamily="49" charset="0"/>
+              </a:rPr>
+              <a:t>to</a:t>
+            </a:r>
+            <a:r>
+              <a:rPr lang="de-DE" sz="1600" dirty="0">
+                <a:latin typeface="Consolas" panose="020B0609020204030204" pitchFamily="49" charset="0"/>
+              </a:rPr>
+              <a:t>/</a:t>
+            </a:r>
+            <a:r>
+              <a:rPr lang="de-DE" sz="1600" dirty="0" err="1">
+                <a:latin typeface="Consolas" panose="020B0609020204030204" pitchFamily="49" charset="0"/>
+              </a:rPr>
+              <a:t>run</a:t>
+            </a:r>
+            <a:r>
+              <a:rPr lang="de-DE" sz="1600" dirty="0">
+                <a:latin typeface="Consolas" panose="020B0609020204030204" pitchFamily="49" charset="0"/>
+              </a:rPr>
+              <a:t>/</a:t>
+            </a:r>
+            <a:r>
+              <a:rPr lang="de-DE" sz="1600" dirty="0" err="1">
+                <a:latin typeface="Consolas" panose="020B0609020204030204" pitchFamily="49" charset="0"/>
+              </a:rPr>
+              <a:t>another</a:t>
+            </a:r>
+            <a:r>
+              <a:rPr lang="de-DE" sz="1600" dirty="0">
+                <a:latin typeface="Consolas" panose="020B0609020204030204" pitchFamily="49" charset="0"/>
+              </a:rPr>
+              <a:t>/</a:t>
+            </a:r>
+            <a:r>
+              <a:rPr lang="de-DE" sz="1600" dirty="0" err="1">
+                <a:latin typeface="Consolas" panose="020B0609020204030204" pitchFamily="49" charset="0"/>
+              </a:rPr>
+              <a:t>test</a:t>
+            </a:r>
+            <a:r>
+              <a:rPr lang="de-DE" sz="1600" dirty="0">
+                <a:latin typeface="Consolas" panose="020B0609020204030204" pitchFamily="49" charset="0"/>
+              </a:rPr>
+              <a:t> </a:t>
+            </a:r>
+            <a:r>
+              <a:rPr lang="de-DE" sz="1600" dirty="0">
+                <a:solidFill>
+                  <a:srgbClr val="008C5A"/>
+                </a:solidFill>
+                <a:latin typeface="Consolas" panose="020B0609020204030204" pitchFamily="49" charset="0"/>
+              </a:rPr>
+              <a:t># 3. Zwei </a:t>
+            </a:r>
+            <a:r>
+              <a:rPr lang="de-DE" sz="1600" dirty="0" err="1">
+                <a:solidFill>
+                  <a:srgbClr val="008C5A"/>
+                </a:solidFill>
+                <a:latin typeface="Consolas" panose="020B0609020204030204" pitchFamily="49" charset="0"/>
+              </a:rPr>
+              <a:t>paralell</a:t>
+            </a:r>
+            <a:r>
+              <a:rPr lang="de-DE" sz="1600" dirty="0">
+                <a:solidFill>
+                  <a:srgbClr val="008C5A"/>
+                </a:solidFill>
+                <a:latin typeface="Consolas" panose="020B0609020204030204" pitchFamily="49" charset="0"/>
+              </a:rPr>
+              <a:t> laufende Tests</a:t>
+            </a:r>
+          </a:p>
+          <a:p>
+            <a:pPr marL="0" indent="0">
+              <a:buNone/>
+            </a:pPr>
+            <a:endParaRPr lang="de-DE" sz="1600" dirty="0">
+              <a:latin typeface="Consolas" panose="020B0609020204030204" pitchFamily="49" charset="0"/>
+            </a:endParaRPr>
+          </a:p>
+          <a:p>
+            <a:pPr marL="0" indent="0">
+              <a:buNone/>
+            </a:pPr>
+            <a:endParaRPr lang="de-DE" sz="1600" dirty="0">
+              <a:latin typeface="Consolas" panose="020B0609020204030204" pitchFamily="49" charset="0"/>
+            </a:endParaRPr>
+          </a:p>
+          <a:p>
+            <a:pPr marL="0" indent="0">
+              <a:buNone/>
+            </a:pPr>
+            <a:endParaRPr lang="de-DE" sz="1600" dirty="0">
+              <a:latin typeface="Consolas" panose="020B0609020204030204" pitchFamily="49" charset="0"/>
+            </a:endParaRPr>
+          </a:p>
+        </p:txBody>
+      </p:sp>
+    </p:spTree>
+    <p:extLst>
+      <p:ext uri="{BB962C8B-B14F-4D97-AF65-F5344CB8AC3E}">
+        <p14:creationId xmlns:p14="http://schemas.microsoft.com/office/powerpoint/2010/main" val="3546609096"/>
       </p:ext>
     </p:extLst>
   </p:cSld>

</xml_diff>